<commit_message>
updating model evaluation in readme file
</commit_message>
<xml_diff>
--- a/Presentation.pptx
+++ b/Presentation.pptx
@@ -12945,7 +12945,7 @@
         </p:spPr>
         <p:txBody>
           <a:bodyPr>
-            <a:normAutofit fontScale="85000" lnSpcReduction="10000"/>
+            <a:normAutofit fontScale="85000" lnSpcReduction="20000"/>
           </a:bodyPr>
           <a:lstStyle/>
           <a:p>
@@ -12963,7 +12963,7 @@
           <a:p>
             <a:r>
               <a:rPr lang="en-US" dirty="0"/>
-              <a:t>TF-IDF was introduced to apply weighting to the text and chunks, after which the model was re-evaluated.</a:t>
+              <a:t>TF-IDF weighting was applied to emphasize key terms within text chunks, and FAISS indexing was integrated to enable faster and more accurate similarity searches, after which the model was re-evaluated to confirm improved retrieval performance.</a:t>
             </a:r>
           </a:p>
           <a:p>
@@ -13153,13 +13153,13 @@
           <p:nvPr>
             <p:extLst>
               <p:ext uri="{D42A27DB-BD31-4B8C-83A1-F6EECF244321}">
-                <p14:modId xmlns:p14="http://schemas.microsoft.com/office/powerpoint/2010/main" val="700000270"/>
+                <p14:modId xmlns:p14="http://schemas.microsoft.com/office/powerpoint/2010/main" val="3352120447"/>
               </p:ext>
             </p:extLst>
           </p:nvPr>
         </p:nvGraphicFramePr>
         <p:xfrm>
-          <a:off x="617086" y="3606800"/>
+          <a:off x="539014" y="4001435"/>
           <a:ext cx="8127999" cy="741680"/>
         </p:xfrm>
         <a:graphic>
@@ -13245,7 +13245,7 @@
                     <a:p>
                       <a:r>
                         <a:rPr lang="en-US" dirty="0"/>
-                        <a:t>0.64</a:t>
+                        <a:t>0.73</a:t>
                       </a:r>
                     </a:p>
                   </a:txBody>
@@ -13258,7 +13258,7 @@
                     <a:p>
                       <a:r>
                         <a:rPr lang="en-US" dirty="0"/>
-                        <a:t>0.61</a:t>
+                        <a:t>0.40</a:t>
                       </a:r>
                     </a:p>
                   </a:txBody>
@@ -13271,7 +13271,7 @@
                     <a:p>
                       <a:r>
                         <a:rPr lang="en-US" dirty="0"/>
-                        <a:t>0.83</a:t>
+                        <a:t>0.81</a:t>
                       </a:r>
                     </a:p>
                   </a:txBody>
@@ -13418,7 +13418,17 @@
                 <a:ea typeface="Calibri" panose="020F0502020204030204" pitchFamily="34" charset="0"/>
                 <a:cs typeface="Calibri" panose="020F0502020204030204" pitchFamily="34" charset="0"/>
               </a:rPr>
-              <a:t>– specifies project dependencies.app.py – main application script for model interaction and user queries.</a:t>
+              <a:t>– specifies project dependencies.</a:t>
+            </a:r>
+          </a:p>
+          <a:p>
+            <a:r>
+              <a:rPr lang="en-US" sz="1800" dirty="0">
+                <a:latin typeface="Calibri" panose="020F0502020204030204" pitchFamily="34" charset="0"/>
+                <a:ea typeface="Calibri" panose="020F0502020204030204" pitchFamily="34" charset="0"/>
+                <a:cs typeface="Calibri" panose="020F0502020204030204" pitchFamily="34" charset="0"/>
+              </a:rPr>
+              <a:t>app.py – main application script for model interaction and user queries.</a:t>
             </a:r>
           </a:p>
           <a:p>
@@ -14122,15 +14132,7 @@
           <a:p>
             <a:r>
               <a:rPr lang="en-US" sz="2800" i="1" dirty="0"/>
-              <a:t>Agnes </a:t>
-            </a:r>
-            <a:r>
-              <a:rPr lang="en-US" sz="2800" i="1" dirty="0" err="1"/>
-              <a:t>Chomba</a:t>
-            </a:r>
-            <a:r>
-              <a:rPr lang="en-US" sz="2800" i="1" dirty="0"/>
-              <a:t> Data Scientist/ Scrum Master</a:t>
+              <a:t>Agnes Chomba - Data Scientist/ Scrum Master</a:t>
             </a:r>
           </a:p>
           <a:p>
@@ -14162,7 +14164,7 @@
             </a:r>
             <a:r>
               <a:rPr lang="en-US" sz="2800" i="1" dirty="0"/>
-              <a:t> – Snr Data Scientist</a:t>
+              <a:t> – Data Scientist</a:t>
             </a:r>
           </a:p>
           <a:p>
@@ -14630,94 +14632,694 @@
       </p:sp>
       <p:sp>
         <p:nvSpPr>
-          <p:cNvPr id="3" name="Content Placeholder 2">
+          <p:cNvPr id="5" name="Rectangle 2">
             <a:extLst>
               <a:ext uri="{FF2B5EF4-FFF2-40B4-BE49-F238E27FC236}">
-                <a16:creationId xmlns:a16="http://schemas.microsoft.com/office/drawing/2014/main" id="{9514270E-2AE0-4FD8-8E86-AD842ED49A5C}"/>
+                <a16:creationId xmlns:a16="http://schemas.microsoft.com/office/drawing/2014/main" id="{1AA11E25-826E-4898-B98D-8DEAF221D405}"/>
               </a:ext>
             </a:extLst>
           </p:cNvPr>
           <p:cNvSpPr>
-            <a:spLocks noGrp="1"/>
+            <a:spLocks noGrp="1" noChangeArrowheads="1"/>
           </p:cNvSpPr>
           <p:nvPr>
             <p:ph idx="1"/>
           </p:nvPr>
         </p:nvSpPr>
-        <p:spPr/>
+        <p:spPr bwMode="auto">
+          <a:xfrm>
+            <a:off x="1141413" y="2127519"/>
+            <a:ext cx="9330874" cy="3785652"/>
+          </a:xfrm>
+          <a:prstGeom prst="rect">
+            <a:avLst/>
+          </a:prstGeom>
+          <a:noFill/>
+          <a:ln>
+            <a:noFill/>
+          </a:ln>
+          <a:effectLst/>
+          <a:extLst>
+            <a:ext uri="{909E8E84-426E-40DD-AFC4-6F175D3DCCD1}">
+              <a14:hiddenFill xmlns:a14="http://schemas.microsoft.com/office/drawing/2010/main">
+                <a:solidFill>
+                  <a:schemeClr val="accent1"/>
+                </a:solidFill>
+              </a14:hiddenFill>
+            </a:ext>
+            <a:ext uri="{91240B29-F687-4F45-9708-019B960494DF}">
+              <a14:hiddenLine xmlns:a14="http://schemas.microsoft.com/office/drawing/2010/main" w="9525">
+                <a:solidFill>
+                  <a:schemeClr val="tx1"/>
+                </a:solidFill>
+                <a:miter lim="800000"/>
+                <a:headEnd/>
+                <a:tailEnd/>
+              </a14:hiddenLine>
+            </a:ext>
+            <a:ext uri="{AF507438-7753-43E0-B8FC-AC1667EBCBE1}">
+              <a14:hiddenEffects xmlns:a14="http://schemas.microsoft.com/office/drawing/2010/main">
+                <a:effectLst>
+                  <a:outerShdw dist="35921" dir="2700000" algn="ctr" rotWithShape="0">
+                    <a:schemeClr val="bg2"/>
+                  </a:outerShdw>
+                </a:effectLst>
+              </a14:hiddenEffects>
+            </a:ext>
+          </a:extLst>
+        </p:spPr>
         <p:txBody>
-          <a:bodyPr>
-            <a:normAutofit fontScale="92500" lnSpcReduction="20000"/>
+          <a:bodyPr vert="horz" wrap="square" lIns="91440" tIns="45720" rIns="91440" bIns="45720" numCol="1" anchor="ctr" anchorCtr="0" compatLnSpc="1">
+            <a:prstTxWarp prst="textNoShape">
+              <a:avLst/>
+            </a:prstTxWarp>
+            <a:spAutoFit/>
           </a:bodyPr>
           <a:lstStyle/>
           <a:p>
-            <a:r>
-              <a:rPr lang="en-US" dirty="0"/>
-              <a:t>Our data source is an Internal Compliance policy, its stored in Word (.docx) format.</a:t>
-            </a:r>
-          </a:p>
-          <a:p>
-            <a:r>
-              <a:rPr lang="en-US" dirty="0"/>
-              <a:t>It contains :</a:t>
-            </a:r>
-          </a:p>
-          <a:p>
-            <a:r>
-              <a:rPr lang="en-US" dirty="0"/>
-              <a:t>KYC </a:t>
-            </a:r>
-            <a:r>
-              <a:rPr lang="en-US" err="1"/>
-              <a:t>procedures</a:t>
-            </a:r>
-            <a:r>
-              <a:rPr lang="en-US"/>
-              <a:t>, AML </a:t>
-            </a:r>
-            <a:r>
-              <a:rPr lang="en-US" dirty="0"/>
-              <a:t>red flags ,Risk Rating </a:t>
-            </a:r>
-            <a:r>
-              <a:rPr lang="en-US" dirty="0" err="1"/>
-              <a:t>Methodology,regulatory</a:t>
-            </a:r>
-            <a:r>
-              <a:rPr lang="en-US" dirty="0"/>
-              <a:t> guidelines( FATF,CBK,CMA)</a:t>
-            </a:r>
-          </a:p>
-          <a:p>
-            <a:endParaRPr lang="en-US" dirty="0"/>
-          </a:p>
-          <a:p>
-            <a:r>
-              <a:rPr lang="en-US" dirty="0"/>
-              <a:t>Data Characteristics; Unstructured text(</a:t>
-            </a:r>
-            <a:r>
-              <a:rPr lang="en-US" dirty="0" err="1"/>
-              <a:t>paragraphs,checklists</a:t>
-            </a:r>
-            <a:r>
-              <a:rPr lang="en-US" dirty="0"/>
-              <a:t>) Multiple sections (</a:t>
-            </a:r>
-            <a:r>
-              <a:rPr lang="en-US" dirty="0" err="1"/>
-              <a:t>policies,procedures,workflows</a:t>
-            </a:r>
-            <a:r>
-              <a:rPr lang="en-US" dirty="0"/>
-              <a:t>)</a:t>
-            </a:r>
-          </a:p>
-          <a:p>
-            <a:r>
-              <a:rPr lang="en-US" dirty="0"/>
-              <a:t>The data will undergo preprocessing before AI ingestion</a:t>
-            </a:r>
+            <a:pPr marL="0" marR="0" lvl="0" indent="0" algn="l" defTabSz="914400" rtl="0" eaLnBrk="0" fontAlgn="base" latinLnBrk="0" hangingPunct="0">
+              <a:lnSpc>
+                <a:spcPct val="100000"/>
+              </a:lnSpc>
+              <a:spcBef>
+                <a:spcPct val="0"/>
+              </a:spcBef>
+              <a:spcAft>
+                <a:spcPct val="0"/>
+              </a:spcAft>
+              <a:buClrTx/>
+              <a:buSzTx/>
+              <a:buNone/>
+              <a:tabLst/>
+            </a:pPr>
+            <a:r>
+              <a:rPr kumimoji="0" lang="en-US" altLang="en-US" sz="2000" b="1" i="0" u="none" strike="noStrike" cap="none" normalizeH="0" baseline="0" dirty="0">
+                <a:ln>
+                  <a:noFill/>
+                </a:ln>
+                <a:solidFill>
+                  <a:schemeClr val="tx1"/>
+                </a:solidFill>
+                <a:effectLst/>
+                <a:latin typeface="Arial" panose="020B0604020202020204" pitchFamily="34" charset="0"/>
+              </a:rPr>
+              <a:t>Data Source:</a:t>
+            </a:r>
+            <a:endParaRPr kumimoji="0" lang="en-US" altLang="en-US" sz="2000" b="0" i="0" u="none" strike="noStrike" cap="none" normalizeH="0" baseline="0" dirty="0">
+              <a:ln>
+                <a:noFill/>
+              </a:ln>
+              <a:solidFill>
+                <a:schemeClr val="tx1"/>
+              </a:solidFill>
+              <a:effectLst/>
+              <a:latin typeface="Arial" panose="020B0604020202020204" pitchFamily="34" charset="0"/>
+            </a:endParaRPr>
+          </a:p>
+          <a:p>
+            <a:pPr marL="0" marR="0" lvl="0" indent="0" algn="l" defTabSz="914400" rtl="0" eaLnBrk="0" fontAlgn="base" latinLnBrk="0" hangingPunct="0">
+              <a:lnSpc>
+                <a:spcPct val="100000"/>
+              </a:lnSpc>
+              <a:spcBef>
+                <a:spcPct val="0"/>
+              </a:spcBef>
+              <a:spcAft>
+                <a:spcPct val="0"/>
+              </a:spcAft>
+              <a:buClrTx/>
+              <a:buSzTx/>
+              <a:buFontTx/>
+              <a:buChar char="•"/>
+              <a:tabLst/>
+            </a:pPr>
+            <a:r>
+              <a:rPr kumimoji="0" lang="en-US" altLang="en-US" sz="2000" b="0" i="0" u="none" strike="noStrike" cap="none" normalizeH="0" baseline="0" dirty="0">
+                <a:ln>
+                  <a:noFill/>
+                </a:ln>
+                <a:solidFill>
+                  <a:schemeClr val="tx1"/>
+                </a:solidFill>
+                <a:effectLst/>
+                <a:latin typeface="Arial" panose="020B0604020202020204" pitchFamily="34" charset="0"/>
+              </a:rPr>
+              <a:t>Internal </a:t>
+            </a:r>
+            <a:r>
+              <a:rPr kumimoji="0" lang="en-US" altLang="en-US" sz="2000" b="1" i="0" u="none" strike="noStrike" cap="none" normalizeH="0" baseline="0" dirty="0">
+                <a:ln>
+                  <a:noFill/>
+                </a:ln>
+                <a:solidFill>
+                  <a:schemeClr val="tx1"/>
+                </a:solidFill>
+                <a:effectLst/>
+                <a:latin typeface="Arial" panose="020B0604020202020204" pitchFamily="34" charset="0"/>
+              </a:rPr>
+              <a:t>Compliance Policy Document</a:t>
+            </a:r>
+            <a:r>
+              <a:rPr kumimoji="0" lang="en-US" altLang="en-US" sz="2000" b="0" i="0" u="none" strike="noStrike" cap="none" normalizeH="0" baseline="0" dirty="0">
+                <a:ln>
+                  <a:noFill/>
+                </a:ln>
+                <a:solidFill>
+                  <a:schemeClr val="tx1"/>
+                </a:solidFill>
+                <a:effectLst/>
+                <a:latin typeface="Arial" panose="020B0604020202020204" pitchFamily="34" charset="0"/>
+              </a:rPr>
+              <a:t> stored in </a:t>
+            </a:r>
+            <a:r>
+              <a:rPr kumimoji="0" lang="en-US" altLang="en-US" sz="2000" b="1" i="0" u="none" strike="noStrike" cap="none" normalizeH="0" baseline="0" dirty="0">
+                <a:ln>
+                  <a:noFill/>
+                </a:ln>
+                <a:solidFill>
+                  <a:schemeClr val="tx1"/>
+                </a:solidFill>
+                <a:effectLst/>
+                <a:latin typeface="Arial" panose="020B0604020202020204" pitchFamily="34" charset="0"/>
+              </a:rPr>
+              <a:t>Word (.docx)</a:t>
+            </a:r>
+            <a:r>
+              <a:rPr kumimoji="0" lang="en-US" altLang="en-US" sz="2000" b="0" i="0" u="none" strike="noStrike" cap="none" normalizeH="0" baseline="0" dirty="0">
+                <a:ln>
+                  <a:noFill/>
+                </a:ln>
+                <a:solidFill>
+                  <a:schemeClr val="tx1"/>
+                </a:solidFill>
+                <a:effectLst/>
+                <a:latin typeface="Arial" panose="020B0604020202020204" pitchFamily="34" charset="0"/>
+              </a:rPr>
+              <a:t> format.</a:t>
+            </a:r>
+          </a:p>
+          <a:p>
+            <a:pPr marL="0" marR="0" lvl="0" indent="0" algn="l" defTabSz="914400" rtl="0" eaLnBrk="0" fontAlgn="base" latinLnBrk="0" hangingPunct="0">
+              <a:lnSpc>
+                <a:spcPct val="100000"/>
+              </a:lnSpc>
+              <a:spcBef>
+                <a:spcPct val="0"/>
+              </a:spcBef>
+              <a:spcAft>
+                <a:spcPct val="0"/>
+              </a:spcAft>
+              <a:buClrTx/>
+              <a:buSzTx/>
+              <a:buNone/>
+              <a:tabLst/>
+            </a:pPr>
+            <a:endParaRPr kumimoji="0" lang="en-US" altLang="en-US" sz="2000" b="0" i="0" u="none" strike="noStrike" cap="none" normalizeH="0" baseline="0" dirty="0">
+              <a:ln>
+                <a:noFill/>
+              </a:ln>
+              <a:solidFill>
+                <a:schemeClr val="tx1"/>
+              </a:solidFill>
+              <a:effectLst/>
+              <a:latin typeface="Arial" panose="020B0604020202020204" pitchFamily="34" charset="0"/>
+            </a:endParaRPr>
+          </a:p>
+          <a:p>
+            <a:pPr marL="0" marR="0" lvl="0" indent="0" algn="l" defTabSz="914400" rtl="0" eaLnBrk="0" fontAlgn="base" latinLnBrk="0" hangingPunct="0">
+              <a:lnSpc>
+                <a:spcPct val="100000"/>
+              </a:lnSpc>
+              <a:spcBef>
+                <a:spcPct val="0"/>
+              </a:spcBef>
+              <a:spcAft>
+                <a:spcPct val="0"/>
+              </a:spcAft>
+              <a:buClrTx/>
+              <a:buSzTx/>
+              <a:buNone/>
+              <a:tabLst/>
+            </a:pPr>
+            <a:r>
+              <a:rPr kumimoji="0" lang="en-US" altLang="en-US" sz="2000" b="1" i="0" u="none" strike="noStrike" cap="none" normalizeH="0" baseline="0" dirty="0">
+                <a:ln>
+                  <a:noFill/>
+                </a:ln>
+                <a:solidFill>
+                  <a:schemeClr val="tx1"/>
+                </a:solidFill>
+                <a:effectLst/>
+                <a:latin typeface="Arial" panose="020B0604020202020204" pitchFamily="34" charset="0"/>
+              </a:rPr>
+              <a:t>Content Overview:</a:t>
+            </a:r>
+            <a:endParaRPr kumimoji="0" lang="en-US" altLang="en-US" sz="2000" b="0" i="0" u="none" strike="noStrike" cap="none" normalizeH="0" baseline="0" dirty="0">
+              <a:ln>
+                <a:noFill/>
+              </a:ln>
+              <a:solidFill>
+                <a:schemeClr val="tx1"/>
+              </a:solidFill>
+              <a:effectLst/>
+              <a:latin typeface="Arial" panose="020B0604020202020204" pitchFamily="34" charset="0"/>
+            </a:endParaRPr>
+          </a:p>
+          <a:p>
+            <a:pPr marL="0" marR="0" lvl="0" indent="0" algn="l" defTabSz="914400" rtl="0" eaLnBrk="0" fontAlgn="base" latinLnBrk="0" hangingPunct="0">
+              <a:lnSpc>
+                <a:spcPct val="100000"/>
+              </a:lnSpc>
+              <a:spcBef>
+                <a:spcPct val="0"/>
+              </a:spcBef>
+              <a:spcAft>
+                <a:spcPct val="0"/>
+              </a:spcAft>
+              <a:buClrTx/>
+              <a:buSzTx/>
+              <a:buFontTx/>
+              <a:buChar char="•"/>
+              <a:tabLst/>
+            </a:pPr>
+            <a:r>
+              <a:rPr kumimoji="0" lang="en-US" altLang="en-US" sz="2000" b="0" i="0" u="none" strike="noStrike" cap="none" normalizeH="0" baseline="0" dirty="0">
+                <a:ln>
+                  <a:noFill/>
+                </a:ln>
+                <a:solidFill>
+                  <a:schemeClr val="tx1"/>
+                </a:solidFill>
+                <a:effectLst/>
+                <a:latin typeface="Arial" panose="020B0604020202020204" pitchFamily="34" charset="0"/>
+              </a:rPr>
+              <a:t>Includes </a:t>
+            </a:r>
+            <a:r>
+              <a:rPr kumimoji="0" lang="en-US" altLang="en-US" sz="2000" b="1" i="0" u="none" strike="noStrike" cap="none" normalizeH="0" baseline="0" dirty="0">
+                <a:ln>
+                  <a:noFill/>
+                </a:ln>
+                <a:solidFill>
+                  <a:schemeClr val="tx1"/>
+                </a:solidFill>
+                <a:effectLst/>
+                <a:latin typeface="Arial" panose="020B0604020202020204" pitchFamily="34" charset="0"/>
+              </a:rPr>
+              <a:t>KYC procedures</a:t>
+            </a:r>
+            <a:r>
+              <a:rPr kumimoji="0" lang="en-US" altLang="en-US" sz="2000" b="0" i="0" u="none" strike="noStrike" cap="none" normalizeH="0" baseline="0" dirty="0">
+                <a:ln>
+                  <a:noFill/>
+                </a:ln>
+                <a:solidFill>
+                  <a:schemeClr val="tx1"/>
+                </a:solidFill>
+                <a:effectLst/>
+                <a:latin typeface="Arial" panose="020B0604020202020204" pitchFamily="34" charset="0"/>
+              </a:rPr>
+              <a:t>, </a:t>
+            </a:r>
+            <a:r>
+              <a:rPr kumimoji="0" lang="en-US" altLang="en-US" sz="2000" b="1" i="0" u="none" strike="noStrike" cap="none" normalizeH="0" baseline="0" dirty="0">
+                <a:ln>
+                  <a:noFill/>
+                </a:ln>
+                <a:solidFill>
+                  <a:schemeClr val="tx1"/>
+                </a:solidFill>
+                <a:effectLst/>
+                <a:latin typeface="Arial" panose="020B0604020202020204" pitchFamily="34" charset="0"/>
+              </a:rPr>
+              <a:t>AML red flags</a:t>
+            </a:r>
+            <a:r>
+              <a:rPr kumimoji="0" lang="en-US" altLang="en-US" sz="2000" b="0" i="0" u="none" strike="noStrike" cap="none" normalizeH="0" baseline="0" dirty="0">
+                <a:ln>
+                  <a:noFill/>
+                </a:ln>
+                <a:solidFill>
+                  <a:schemeClr val="tx1"/>
+                </a:solidFill>
+                <a:effectLst/>
+                <a:latin typeface="Arial" panose="020B0604020202020204" pitchFamily="34" charset="0"/>
+              </a:rPr>
+              <a:t>, </a:t>
+            </a:r>
+            <a:r>
+              <a:rPr kumimoji="0" lang="en-US" altLang="en-US" sz="2000" b="1" i="0" u="none" strike="noStrike" cap="none" normalizeH="0" baseline="0" dirty="0">
+                <a:ln>
+                  <a:noFill/>
+                </a:ln>
+                <a:solidFill>
+                  <a:schemeClr val="tx1"/>
+                </a:solidFill>
+                <a:effectLst/>
+                <a:latin typeface="Arial" panose="020B0604020202020204" pitchFamily="34" charset="0"/>
+              </a:rPr>
+              <a:t>Risk Rating Methodology</a:t>
+            </a:r>
+            <a:r>
+              <a:rPr kumimoji="0" lang="en-US" altLang="en-US" sz="2000" b="0" i="0" u="none" strike="noStrike" cap="none" normalizeH="0" baseline="0" dirty="0">
+                <a:ln>
+                  <a:noFill/>
+                </a:ln>
+                <a:solidFill>
+                  <a:schemeClr val="tx1"/>
+                </a:solidFill>
+                <a:effectLst/>
+                <a:latin typeface="Arial" panose="020B0604020202020204" pitchFamily="34" charset="0"/>
+              </a:rPr>
+              <a:t>, and </a:t>
+            </a:r>
+            <a:r>
+              <a:rPr kumimoji="0" lang="en-US" altLang="en-US" sz="2000" b="1" i="0" u="none" strike="noStrike" cap="none" normalizeH="0" baseline="0" dirty="0">
+                <a:ln>
+                  <a:noFill/>
+                </a:ln>
+                <a:solidFill>
+                  <a:schemeClr val="tx1"/>
+                </a:solidFill>
+                <a:effectLst/>
+                <a:latin typeface="Arial" panose="020B0604020202020204" pitchFamily="34" charset="0"/>
+              </a:rPr>
+              <a:t>Regulatory Guidelines</a:t>
+            </a:r>
+            <a:r>
+              <a:rPr kumimoji="0" lang="en-US" altLang="en-US" sz="2000" b="0" i="0" u="none" strike="noStrike" cap="none" normalizeH="0" baseline="0" dirty="0">
+                <a:ln>
+                  <a:noFill/>
+                </a:ln>
+                <a:solidFill>
+                  <a:schemeClr val="tx1"/>
+                </a:solidFill>
+                <a:effectLst/>
+                <a:latin typeface="Arial" panose="020B0604020202020204" pitchFamily="34" charset="0"/>
+              </a:rPr>
+              <a:t> from </a:t>
+            </a:r>
+            <a:r>
+              <a:rPr kumimoji="0" lang="en-US" altLang="en-US" sz="2000" b="1" i="0" u="none" strike="noStrike" cap="none" normalizeH="0" baseline="0" dirty="0">
+                <a:ln>
+                  <a:noFill/>
+                </a:ln>
+                <a:solidFill>
+                  <a:schemeClr val="tx1"/>
+                </a:solidFill>
+                <a:effectLst/>
+                <a:latin typeface="Arial" panose="020B0604020202020204" pitchFamily="34" charset="0"/>
+              </a:rPr>
+              <a:t>FATF</a:t>
+            </a:r>
+            <a:r>
+              <a:rPr kumimoji="0" lang="en-US" altLang="en-US" sz="2000" b="0" i="0" u="none" strike="noStrike" cap="none" normalizeH="0" baseline="0" dirty="0">
+                <a:ln>
+                  <a:noFill/>
+                </a:ln>
+                <a:solidFill>
+                  <a:schemeClr val="tx1"/>
+                </a:solidFill>
+                <a:effectLst/>
+                <a:latin typeface="Arial" panose="020B0604020202020204" pitchFamily="34" charset="0"/>
+              </a:rPr>
+              <a:t>, </a:t>
+            </a:r>
+            <a:r>
+              <a:rPr kumimoji="0" lang="en-US" altLang="en-US" sz="2000" b="1" i="0" u="none" strike="noStrike" cap="none" normalizeH="0" baseline="0" dirty="0">
+                <a:ln>
+                  <a:noFill/>
+                </a:ln>
+                <a:solidFill>
+                  <a:schemeClr val="tx1"/>
+                </a:solidFill>
+                <a:effectLst/>
+                <a:latin typeface="Arial" panose="020B0604020202020204" pitchFamily="34" charset="0"/>
+              </a:rPr>
+              <a:t>CBK</a:t>
+            </a:r>
+            <a:r>
+              <a:rPr kumimoji="0" lang="en-US" altLang="en-US" sz="2000" b="0" i="0" u="none" strike="noStrike" cap="none" normalizeH="0" baseline="0" dirty="0">
+                <a:ln>
+                  <a:noFill/>
+                </a:ln>
+                <a:solidFill>
+                  <a:schemeClr val="tx1"/>
+                </a:solidFill>
+                <a:effectLst/>
+                <a:latin typeface="Arial" panose="020B0604020202020204" pitchFamily="34" charset="0"/>
+              </a:rPr>
+              <a:t>, and </a:t>
+            </a:r>
+            <a:r>
+              <a:rPr kumimoji="0" lang="en-US" altLang="en-US" sz="2000" b="1" i="0" u="none" strike="noStrike" cap="none" normalizeH="0" baseline="0" dirty="0">
+                <a:ln>
+                  <a:noFill/>
+                </a:ln>
+                <a:solidFill>
+                  <a:schemeClr val="tx1"/>
+                </a:solidFill>
+                <a:effectLst/>
+                <a:latin typeface="Arial" panose="020B0604020202020204" pitchFamily="34" charset="0"/>
+              </a:rPr>
+              <a:t>CMA</a:t>
+            </a:r>
+            <a:r>
+              <a:rPr kumimoji="0" lang="en-US" altLang="en-US" sz="2000" b="0" i="0" u="none" strike="noStrike" cap="none" normalizeH="0" baseline="0" dirty="0">
+                <a:ln>
+                  <a:noFill/>
+                </a:ln>
+                <a:solidFill>
+                  <a:schemeClr val="tx1"/>
+                </a:solidFill>
+                <a:effectLst/>
+                <a:latin typeface="Arial" panose="020B0604020202020204" pitchFamily="34" charset="0"/>
+              </a:rPr>
+              <a:t>.</a:t>
+            </a:r>
+          </a:p>
+          <a:p>
+            <a:pPr marL="0" marR="0" lvl="0" indent="0" algn="l" defTabSz="914400" rtl="0" eaLnBrk="0" fontAlgn="base" latinLnBrk="0" hangingPunct="0">
+              <a:lnSpc>
+                <a:spcPct val="100000"/>
+              </a:lnSpc>
+              <a:spcBef>
+                <a:spcPct val="0"/>
+              </a:spcBef>
+              <a:spcAft>
+                <a:spcPct val="0"/>
+              </a:spcAft>
+              <a:buClrTx/>
+              <a:buSzTx/>
+              <a:buNone/>
+              <a:tabLst/>
+            </a:pPr>
+            <a:endParaRPr kumimoji="0" lang="en-US" altLang="en-US" sz="2000" b="0" i="0" u="none" strike="noStrike" cap="none" normalizeH="0" baseline="0" dirty="0">
+              <a:ln>
+                <a:noFill/>
+              </a:ln>
+              <a:solidFill>
+                <a:schemeClr val="tx1"/>
+              </a:solidFill>
+              <a:effectLst/>
+              <a:latin typeface="Arial" panose="020B0604020202020204" pitchFamily="34" charset="0"/>
+            </a:endParaRPr>
+          </a:p>
+          <a:p>
+            <a:pPr marL="0" marR="0" lvl="0" indent="0" algn="l" defTabSz="914400" rtl="0" eaLnBrk="0" fontAlgn="base" latinLnBrk="0" hangingPunct="0">
+              <a:lnSpc>
+                <a:spcPct val="100000"/>
+              </a:lnSpc>
+              <a:spcBef>
+                <a:spcPct val="0"/>
+              </a:spcBef>
+              <a:spcAft>
+                <a:spcPct val="0"/>
+              </a:spcAft>
+              <a:buClrTx/>
+              <a:buSzTx/>
+              <a:buNone/>
+              <a:tabLst/>
+            </a:pPr>
+            <a:r>
+              <a:rPr kumimoji="0" lang="en-US" altLang="en-US" sz="2000" b="1" i="0" u="none" strike="noStrike" cap="none" normalizeH="0" baseline="0" dirty="0">
+                <a:ln>
+                  <a:noFill/>
+                </a:ln>
+                <a:solidFill>
+                  <a:schemeClr val="tx1"/>
+                </a:solidFill>
+                <a:effectLst/>
+                <a:latin typeface="Arial" panose="020B0604020202020204" pitchFamily="34" charset="0"/>
+              </a:rPr>
+              <a:t>Data Characteristics:</a:t>
+            </a:r>
+            <a:endParaRPr kumimoji="0" lang="en-US" altLang="en-US" sz="2000" b="0" i="0" u="none" strike="noStrike" cap="none" normalizeH="0" baseline="0" dirty="0">
+              <a:ln>
+                <a:noFill/>
+              </a:ln>
+              <a:solidFill>
+                <a:schemeClr val="tx1"/>
+              </a:solidFill>
+              <a:effectLst/>
+              <a:latin typeface="Arial" panose="020B0604020202020204" pitchFamily="34" charset="0"/>
+            </a:endParaRPr>
+          </a:p>
+          <a:p>
+            <a:pPr marL="0" marR="0" lvl="0" indent="0" algn="l" defTabSz="914400" rtl="0" eaLnBrk="0" fontAlgn="base" latinLnBrk="0" hangingPunct="0">
+              <a:lnSpc>
+                <a:spcPct val="100000"/>
+              </a:lnSpc>
+              <a:spcBef>
+                <a:spcPct val="0"/>
+              </a:spcBef>
+              <a:spcAft>
+                <a:spcPct val="0"/>
+              </a:spcAft>
+              <a:buClrTx/>
+              <a:buSzTx/>
+              <a:buFontTx/>
+              <a:buChar char="•"/>
+              <a:tabLst/>
+            </a:pPr>
+            <a:r>
+              <a:rPr kumimoji="0" lang="en-US" altLang="en-US" sz="2000" b="1" i="0" u="none" strike="noStrike" cap="none" normalizeH="0" baseline="0" dirty="0">
+                <a:ln>
+                  <a:noFill/>
+                </a:ln>
+                <a:solidFill>
+                  <a:schemeClr val="tx1"/>
+                </a:solidFill>
+                <a:effectLst/>
+                <a:latin typeface="Arial" panose="020B0604020202020204" pitchFamily="34" charset="0"/>
+              </a:rPr>
+              <a:t>Unstructured text</a:t>
+            </a:r>
+            <a:r>
+              <a:rPr kumimoji="0" lang="en-US" altLang="en-US" sz="2000" b="0" i="0" u="none" strike="noStrike" cap="none" normalizeH="0" baseline="0" dirty="0">
+                <a:ln>
+                  <a:noFill/>
+                </a:ln>
+                <a:solidFill>
+                  <a:schemeClr val="tx1"/>
+                </a:solidFill>
+                <a:effectLst/>
+                <a:latin typeface="Arial" panose="020B0604020202020204" pitchFamily="34" charset="0"/>
+              </a:rPr>
+              <a:t> – paragraphs, checklists, and detailed descriptions.</a:t>
+            </a:r>
+          </a:p>
+          <a:p>
+            <a:pPr marL="0" marR="0" lvl="0" indent="0" algn="l" defTabSz="914400" rtl="0" eaLnBrk="0" fontAlgn="base" latinLnBrk="0" hangingPunct="0">
+              <a:lnSpc>
+                <a:spcPct val="100000"/>
+              </a:lnSpc>
+              <a:spcBef>
+                <a:spcPct val="0"/>
+              </a:spcBef>
+              <a:spcAft>
+                <a:spcPct val="0"/>
+              </a:spcAft>
+              <a:buClrTx/>
+              <a:buSzTx/>
+              <a:buFontTx/>
+              <a:buChar char="•"/>
+              <a:tabLst/>
+            </a:pPr>
+            <a:r>
+              <a:rPr kumimoji="0" lang="en-US" altLang="en-US" sz="2000" b="0" i="0" u="none" strike="noStrike" cap="none" normalizeH="0" baseline="0" dirty="0">
+                <a:ln>
+                  <a:noFill/>
+                </a:ln>
+                <a:solidFill>
+                  <a:schemeClr val="tx1"/>
+                </a:solidFill>
+                <a:effectLst/>
+                <a:latin typeface="Arial" panose="020B0604020202020204" pitchFamily="34" charset="0"/>
+              </a:rPr>
+              <a:t>Organized into </a:t>
+            </a:r>
+            <a:r>
+              <a:rPr kumimoji="0" lang="en-US" altLang="en-US" sz="2000" b="1" i="0" u="none" strike="noStrike" cap="none" normalizeH="0" baseline="0" dirty="0">
+                <a:ln>
+                  <a:noFill/>
+                </a:ln>
+                <a:solidFill>
+                  <a:schemeClr val="tx1"/>
+                </a:solidFill>
+                <a:effectLst/>
+                <a:latin typeface="Arial" panose="020B0604020202020204" pitchFamily="34" charset="0"/>
+              </a:rPr>
+              <a:t>multiple sections</a:t>
+            </a:r>
+            <a:r>
+              <a:rPr kumimoji="0" lang="en-US" altLang="en-US" sz="2000" b="0" i="0" u="none" strike="noStrike" cap="none" normalizeH="0" baseline="0" dirty="0">
+                <a:ln>
+                  <a:noFill/>
+                </a:ln>
+                <a:solidFill>
+                  <a:schemeClr val="tx1"/>
+                </a:solidFill>
+                <a:effectLst/>
+                <a:latin typeface="Arial" panose="020B0604020202020204" pitchFamily="34" charset="0"/>
+              </a:rPr>
+              <a:t> covering </a:t>
+            </a:r>
+            <a:r>
+              <a:rPr kumimoji="0" lang="en-US" altLang="en-US" sz="2000" b="1" i="0" u="none" strike="noStrike" cap="none" normalizeH="0" baseline="0" dirty="0">
+                <a:ln>
+                  <a:noFill/>
+                </a:ln>
+                <a:solidFill>
+                  <a:schemeClr val="tx1"/>
+                </a:solidFill>
+                <a:effectLst/>
+                <a:latin typeface="Arial" panose="020B0604020202020204" pitchFamily="34" charset="0"/>
+              </a:rPr>
+              <a:t>policies, procedures, and workflows</a:t>
+            </a:r>
+            <a:r>
+              <a:rPr kumimoji="0" lang="en-US" altLang="en-US" sz="2000" b="0" i="0" u="none" strike="noStrike" cap="none" normalizeH="0" baseline="0" dirty="0">
+                <a:ln>
+                  <a:noFill/>
+                </a:ln>
+                <a:solidFill>
+                  <a:schemeClr val="tx1"/>
+                </a:solidFill>
+                <a:effectLst/>
+                <a:latin typeface="Arial" panose="020B0604020202020204" pitchFamily="34" charset="0"/>
+              </a:rPr>
+              <a:t>.</a:t>
+            </a:r>
+          </a:p>
+          <a:p>
+            <a:pPr marL="0" marR="0" lvl="0" indent="0" algn="l" defTabSz="914400" rtl="0" eaLnBrk="0" fontAlgn="base" latinLnBrk="0" hangingPunct="0">
+              <a:lnSpc>
+                <a:spcPct val="100000"/>
+              </a:lnSpc>
+              <a:spcBef>
+                <a:spcPct val="0"/>
+              </a:spcBef>
+              <a:spcAft>
+                <a:spcPct val="0"/>
+              </a:spcAft>
+              <a:buClrTx/>
+              <a:buSzTx/>
+              <a:buFontTx/>
+              <a:buNone/>
+              <a:tabLst/>
+            </a:pPr>
+            <a:endParaRPr kumimoji="0" lang="en-US" altLang="en-US" sz="2000" b="0" i="0" u="none" strike="noStrike" cap="none" normalizeH="0" baseline="0" dirty="0">
+              <a:ln>
+                <a:noFill/>
+              </a:ln>
+              <a:solidFill>
+                <a:schemeClr val="tx1"/>
+              </a:solidFill>
+              <a:effectLst/>
+              <a:latin typeface="Arial" panose="020B0604020202020204" pitchFamily="34" charset="0"/>
+            </a:endParaRPr>
           </a:p>
         </p:txBody>
       </p:sp>
@@ -14786,10 +15388,10 @@
       </p:sp>
       <p:sp>
         <p:nvSpPr>
-          <p:cNvPr id="3" name="Content Placeholder 2">
+          <p:cNvPr id="13" name="Content Placeholder 12">
             <a:extLst>
               <a:ext uri="{FF2B5EF4-FFF2-40B4-BE49-F238E27FC236}">
-                <a16:creationId xmlns:a16="http://schemas.microsoft.com/office/drawing/2014/main" id="{3B6AB4B3-4598-4CAC-A3D6-21CAF3629DB2}"/>
+                <a16:creationId xmlns:a16="http://schemas.microsoft.com/office/drawing/2014/main" id="{E042C498-1D2B-446C-91C0-D56544080787}"/>
               </a:ext>
             </a:extLst>
           </p:cNvPr>
@@ -14802,8 +15404,8 @@
         </p:nvSpPr>
         <p:spPr>
           <a:xfrm>
-            <a:off x="885524" y="1674795"/>
-            <a:ext cx="10468276" cy="4373077"/>
+            <a:off x="1141412" y="1559293"/>
+            <a:ext cx="9905999" cy="4231908"/>
           </a:xfrm>
         </p:spPr>
         <p:txBody>
@@ -14812,92 +15414,55 @@
           </a:bodyPr>
           <a:lstStyle/>
           <a:p>
+            <a:pPr marL="514350" indent="-514350">
+              <a:buFont typeface="+mj-lt"/>
+              <a:buAutoNum type="romanLcPeriod"/>
+            </a:pPr>
             <a:r>
               <a:rPr lang="en-US" dirty="0"/>
-              <a:t>The Project utilized Python libraries to pre process the data before Ai ingestions</a:t>
-            </a:r>
-          </a:p>
-          <a:p>
+              <a:t>Cleaning &amp; Structuring: Fixed encoding issues, removed line breaks, and organized text for readability.</a:t>
+            </a:r>
+          </a:p>
+          <a:p>
+            <a:pPr marL="514350" indent="-514350">
+              <a:buFont typeface="+mj-lt"/>
+              <a:buAutoNum type="romanLcPeriod"/>
+            </a:pPr>
             <a:r>
               <a:rPr lang="en-US" dirty="0"/>
-              <a:t>This Libraries are </a:t>
-            </a:r>
-            <a:r>
-              <a:rPr lang="en-US" dirty="0" err="1"/>
-              <a:t>pandas,numpy.docx,pickle</a:t>
-            </a:r>
+              <a:t>Removing Noise: Eliminated unwanted symbols, smart quotes, and page numbers.</a:t>
+            </a:r>
+          </a:p>
+          <a:p>
+            <a:pPr marL="514350" indent="-514350">
+              <a:buFont typeface="+mj-lt"/>
+              <a:buAutoNum type="romanLcPeriod"/>
+            </a:pPr>
             <a:r>
               <a:rPr lang="en-US" dirty="0"/>
-              <a:t> ,</a:t>
-            </a:r>
-            <a:r>
-              <a:rPr lang="en-US" dirty="0" err="1"/>
-              <a:t>matplotlib,unicodedata,textwrapper</a:t>
-            </a:r>
+              <a:t>Standardizing Formats: Unified casing, spacing, and punctuation for consistency.</a:t>
+            </a:r>
+          </a:p>
+          <a:p>
+            <a:pPr marL="514350" indent="-514350">
+              <a:buFont typeface="+mj-lt"/>
+              <a:buAutoNum type="romanLcPeriod"/>
+            </a:pPr>
+            <a:r>
+              <a:rPr lang="en-US" dirty="0"/>
+              <a:t>Tokenizing Content: Split text into smaller chunks for efficient embedding and retrieval.</a:t>
+            </a:r>
+          </a:p>
+          <a:p>
+            <a:pPr marL="0" indent="0">
+              <a:buNone/>
+            </a:pPr>
             <a:endParaRPr lang="en-US" dirty="0"/>
           </a:p>
           <a:p>
-            <a:r>
-              <a:rPr lang="en-US" dirty="0"/>
-              <a:t>Preprocessing involved</a:t>
-            </a:r>
-          </a:p>
-          <a:p>
-            <a:pPr lvl="1"/>
-            <a:r>
-              <a:rPr lang="en-US" dirty="0"/>
-              <a:t>Cleaning and structuring the document</a:t>
-            </a:r>
-          </a:p>
-          <a:p>
-            <a:pPr lvl="1"/>
-            <a:r>
-              <a:rPr lang="en-US" dirty="0"/>
-              <a:t>Remove unwanted characters</a:t>
-            </a:r>
-          </a:p>
-          <a:p>
-            <a:pPr lvl="1"/>
-            <a:r>
-              <a:rPr lang="en-US" dirty="0"/>
-              <a:t>Standardizing text formats</a:t>
-            </a:r>
-          </a:p>
-          <a:p>
-            <a:pPr lvl="1"/>
-            <a:r>
-              <a:rPr lang="en-US" dirty="0"/>
-              <a:t>Tokenizing </a:t>
-            </a:r>
-            <a:r>
-              <a:rPr lang="en-US" dirty="0" err="1"/>
-              <a:t>conten</a:t>
-            </a:r>
-            <a:endParaRPr lang="en-US" dirty="0"/>
-          </a:p>
-          <a:p>
-            <a:pPr lvl="1"/>
-            <a:endParaRPr lang="en-US" dirty="0"/>
-          </a:p>
-          <a:p>
-            <a:pPr marL="457200" lvl="1" indent="0">
+            <a:pPr marL="0" indent="0">
               <a:buNone/>
             </a:pPr>
-            <a:r>
-              <a:rPr lang="en-US" dirty="0"/>
-              <a:t>This ensures that the data is </a:t>
-            </a:r>
-            <a:r>
-              <a:rPr lang="en-US" dirty="0" err="1"/>
-              <a:t>consistent,organized</a:t>
-            </a:r>
-            <a:r>
-              <a:rPr lang="en-US" dirty="0"/>
-              <a:t> and ready for downstream processing</a:t>
-            </a:r>
-          </a:p>
-          <a:p>
-            <a:pPr lvl="1"/>
             <a:endParaRPr lang="en-US" dirty="0"/>
           </a:p>
         </p:txBody>

</xml_diff>

<commit_message>
added one more slide on evaluation
</commit_message>
<xml_diff>
--- a/Presentation.pptx
+++ b/Presentation.pptx
@@ -18,11 +18,12 @@
     <p:sldId id="264" r:id="rId12"/>
     <p:sldId id="265" r:id="rId13"/>
     <p:sldId id="274" r:id="rId14"/>
-    <p:sldId id="267" r:id="rId15"/>
-    <p:sldId id="268" r:id="rId16"/>
-    <p:sldId id="273" r:id="rId17"/>
-    <p:sldId id="271" r:id="rId18"/>
-    <p:sldId id="269" r:id="rId19"/>
+    <p:sldId id="275" r:id="rId15"/>
+    <p:sldId id="267" r:id="rId16"/>
+    <p:sldId id="268" r:id="rId17"/>
+    <p:sldId id="273" r:id="rId18"/>
+    <p:sldId id="271" r:id="rId19"/>
+    <p:sldId id="269" r:id="rId20"/>
   </p:sldIdLst>
   <p:sldSz cx="12192000" cy="6858000"/>
   <p:notesSz cx="6858000" cy="9144000"/>
@@ -179,7 +180,7 @@
           <a:noFill/>
           <a:extLst>
             <a:ext uri="{909E8E84-426E-40dd-AFC4-6F175D3DCCD1}">
-              <a14:hiddenFill xmlns:a14="http://schemas.microsoft.com/office/drawing/2010/main" xmlns="">
+              <a14:hiddenFill xmlns="" xmlns:a14="http://schemas.microsoft.com/office/drawing/2010/main">
                 <a:solidFill>
                   <a:srgbClr val="FFFFFF"/>
                 </a:solidFill>
@@ -239,7 +240,7 @@
             </a:ln>
             <a:extLst>
               <a:ext uri="{91240B29-F687-4f45-9708-019B960494DF}">
-                <a14:hiddenLine xmlns:a14="http://schemas.microsoft.com/office/drawing/2010/main" xmlns="" w="9525">
+                <a14:hiddenLine xmlns="" xmlns:a14="http://schemas.microsoft.com/office/drawing/2010/main" w="9525">
                   <a:solidFill>
                     <a:srgbClr val="000000"/>
                   </a:solidFill>
@@ -329,7 +330,7 @@
             </a:ln>
             <a:extLst>
               <a:ext uri="{91240B29-F687-4f45-9708-019B960494DF}">
-                <a14:hiddenLine xmlns:a14="http://schemas.microsoft.com/office/drawing/2010/main" xmlns="" w="9525">
+                <a14:hiddenLine xmlns="" xmlns:a14="http://schemas.microsoft.com/office/drawing/2010/main" w="9525">
                   <a:solidFill>
                     <a:srgbClr val="000000"/>
                   </a:solidFill>
@@ -419,7 +420,7 @@
             </a:ln>
             <a:extLst>
               <a:ext uri="{91240B29-F687-4f45-9708-019B960494DF}">
-                <a14:hiddenLine xmlns:a14="http://schemas.microsoft.com/office/drawing/2010/main" xmlns="" w="9525">
+                <a14:hiddenLine xmlns="" xmlns:a14="http://schemas.microsoft.com/office/drawing/2010/main" w="9525">
                   <a:solidFill>
                     <a:srgbClr val="000000"/>
                   </a:solidFill>
@@ -453,7 +454,7 @@
             </a:ln>
             <a:extLst>
               <a:ext uri="{91240B29-F687-4f45-9708-019B960494DF}">
-                <a14:hiddenLine xmlns:a14="http://schemas.microsoft.com/office/drawing/2010/main" xmlns="" w="9525">
+                <a14:hiddenLine xmlns="" xmlns:a14="http://schemas.microsoft.com/office/drawing/2010/main" w="9525">
                   <a:solidFill>
                     <a:srgbClr val="000000"/>
                   </a:solidFill>
@@ -543,7 +544,7 @@
             </a:ln>
             <a:extLst>
               <a:ext uri="{91240B29-F687-4f45-9708-019B960494DF}">
-                <a14:hiddenLine xmlns:a14="http://schemas.microsoft.com/office/drawing/2010/main" xmlns="" w="9525">
+                <a14:hiddenLine xmlns="" xmlns:a14="http://schemas.microsoft.com/office/drawing/2010/main" w="9525">
                   <a:solidFill>
                     <a:srgbClr val="000000"/>
                   </a:solidFill>
@@ -605,7 +606,7 @@
             </a:ln>
             <a:extLst>
               <a:ext uri="{91240B29-F687-4f45-9708-019B960494DF}">
-                <a14:hiddenLine xmlns:a14="http://schemas.microsoft.com/office/drawing/2010/main" xmlns="" w="9525">
+                <a14:hiddenLine xmlns="" xmlns:a14="http://schemas.microsoft.com/office/drawing/2010/main" w="9525">
                   <a:solidFill>
                     <a:srgbClr val="000000"/>
                   </a:solidFill>
@@ -667,7 +668,7 @@
             </a:ln>
             <a:extLst>
               <a:ext uri="{91240B29-F687-4f45-9708-019B960494DF}">
-                <a14:hiddenLine xmlns:a14="http://schemas.microsoft.com/office/drawing/2010/main" xmlns="" w="9525">
+                <a14:hiddenLine xmlns="" xmlns:a14="http://schemas.microsoft.com/office/drawing/2010/main" w="9525">
                   <a:solidFill>
                     <a:srgbClr val="000000"/>
                   </a:solidFill>
@@ -757,7 +758,7 @@
             </a:ln>
             <a:extLst>
               <a:ext uri="{91240B29-F687-4f45-9708-019B960494DF}">
-                <a14:hiddenLine xmlns:a14="http://schemas.microsoft.com/office/drawing/2010/main" xmlns="" w="9525">
+                <a14:hiddenLine xmlns="" xmlns:a14="http://schemas.microsoft.com/office/drawing/2010/main" w="9525">
                   <a:solidFill>
                     <a:srgbClr val="000000"/>
                   </a:solidFill>
@@ -819,7 +820,7 @@
             </a:ln>
             <a:extLst>
               <a:ext uri="{91240B29-F687-4f45-9708-019B960494DF}">
-                <a14:hiddenLine xmlns:a14="http://schemas.microsoft.com/office/drawing/2010/main" xmlns="" w="9525">
+                <a14:hiddenLine xmlns="" xmlns:a14="http://schemas.microsoft.com/office/drawing/2010/main" w="9525">
                   <a:solidFill>
                     <a:srgbClr val="000000"/>
                   </a:solidFill>
@@ -881,7 +882,7 @@
             </a:ln>
             <a:extLst>
               <a:ext uri="{91240B29-F687-4f45-9708-019B960494DF}">
-                <a14:hiddenLine xmlns:a14="http://schemas.microsoft.com/office/drawing/2010/main" xmlns="" w="9525">
+                <a14:hiddenLine xmlns="" xmlns:a14="http://schemas.microsoft.com/office/drawing/2010/main" w="9525">
                   <a:solidFill>
                     <a:srgbClr val="000000"/>
                   </a:solidFill>
@@ -971,7 +972,7 @@
             </a:ln>
             <a:extLst>
               <a:ext uri="{91240B29-F687-4f45-9708-019B960494DF}">
-                <a14:hiddenLine xmlns:a14="http://schemas.microsoft.com/office/drawing/2010/main" xmlns="" w="9525">
+                <a14:hiddenLine xmlns="" xmlns:a14="http://schemas.microsoft.com/office/drawing/2010/main" w="9525">
                   <a:solidFill>
                     <a:srgbClr val="000000"/>
                   </a:solidFill>
@@ -1061,7 +1062,7 @@
             </a:ln>
             <a:extLst>
               <a:ext uri="{91240B29-F687-4f45-9708-019B960494DF}">
-                <a14:hiddenLine xmlns:a14="http://schemas.microsoft.com/office/drawing/2010/main" xmlns="" w="9525">
+                <a14:hiddenLine xmlns="" xmlns:a14="http://schemas.microsoft.com/office/drawing/2010/main" w="9525">
                   <a:solidFill>
                     <a:srgbClr val="000000"/>
                   </a:solidFill>
@@ -1123,7 +1124,7 @@
             </a:ln>
             <a:extLst>
               <a:ext uri="{91240B29-F687-4f45-9708-019B960494DF}">
-                <a14:hiddenLine xmlns:a14="http://schemas.microsoft.com/office/drawing/2010/main" xmlns="" w="9525">
+                <a14:hiddenLine xmlns="" xmlns:a14="http://schemas.microsoft.com/office/drawing/2010/main" w="9525">
                   <a:solidFill>
                     <a:srgbClr val="000000"/>
                   </a:solidFill>
@@ -1233,7 +1234,7 @@
             </a:ln>
             <a:extLst>
               <a:ext uri="{91240B29-F687-4f45-9708-019B960494DF}">
-                <a14:hiddenLine xmlns:a14="http://schemas.microsoft.com/office/drawing/2010/main" xmlns="" w="9525">
+                <a14:hiddenLine xmlns="" xmlns:a14="http://schemas.microsoft.com/office/drawing/2010/main" w="9525">
                   <a:solidFill>
                     <a:srgbClr val="000000"/>
                   </a:solidFill>
@@ -1295,7 +1296,7 @@
             </a:ln>
             <a:extLst>
               <a:ext uri="{91240B29-F687-4f45-9708-019B960494DF}">
-                <a14:hiddenLine xmlns:a14="http://schemas.microsoft.com/office/drawing/2010/main" xmlns="" w="9525">
+                <a14:hiddenLine xmlns="" xmlns:a14="http://schemas.microsoft.com/office/drawing/2010/main" w="9525">
                   <a:solidFill>
                     <a:srgbClr val="000000"/>
                   </a:solidFill>
@@ -1385,7 +1386,7 @@
             </a:ln>
             <a:extLst>
               <a:ext uri="{91240B29-F687-4f45-9708-019B960494DF}">
-                <a14:hiddenLine xmlns:a14="http://schemas.microsoft.com/office/drawing/2010/main" xmlns="" w="9525">
+                <a14:hiddenLine xmlns="" xmlns:a14="http://schemas.microsoft.com/office/drawing/2010/main" w="9525">
                   <a:solidFill>
                     <a:srgbClr val="000000"/>
                   </a:solidFill>
@@ -1475,7 +1476,7 @@
             </a:ln>
             <a:extLst>
               <a:ext uri="{91240B29-F687-4f45-9708-019B960494DF}">
-                <a14:hiddenLine xmlns:a14="http://schemas.microsoft.com/office/drawing/2010/main" xmlns="" w="9525">
+                <a14:hiddenLine xmlns="" xmlns:a14="http://schemas.microsoft.com/office/drawing/2010/main" w="9525">
                   <a:solidFill>
                     <a:srgbClr val="000000"/>
                   </a:solidFill>
@@ -1537,7 +1538,7 @@
             </a:ln>
             <a:extLst>
               <a:ext uri="{91240B29-F687-4f45-9708-019B960494DF}">
-                <a14:hiddenLine xmlns:a14="http://schemas.microsoft.com/office/drawing/2010/main" xmlns="" w="9525">
+                <a14:hiddenLine xmlns="" xmlns:a14="http://schemas.microsoft.com/office/drawing/2010/main" w="9525">
                   <a:solidFill>
                     <a:srgbClr val="000000"/>
                   </a:solidFill>
@@ -1627,7 +1628,7 @@
             </a:ln>
             <a:extLst>
               <a:ext uri="{91240B29-F687-4f45-9708-019B960494DF}">
-                <a14:hiddenLine xmlns:a14="http://schemas.microsoft.com/office/drawing/2010/main" xmlns="" w="9525">
+                <a14:hiddenLine xmlns="" xmlns:a14="http://schemas.microsoft.com/office/drawing/2010/main" w="9525">
                   <a:solidFill>
                     <a:srgbClr val="000000"/>
                   </a:solidFill>
@@ -1717,7 +1718,7 @@
             </a:ln>
             <a:extLst>
               <a:ext uri="{91240B29-F687-4f45-9708-019B960494DF}">
-                <a14:hiddenLine xmlns:a14="http://schemas.microsoft.com/office/drawing/2010/main" xmlns="" w="9525">
+                <a14:hiddenLine xmlns="" xmlns:a14="http://schemas.microsoft.com/office/drawing/2010/main" w="9525">
                   <a:solidFill>
                     <a:srgbClr val="000000"/>
                   </a:solidFill>
@@ -1773,7 +1774,7 @@
             </a:ln>
             <a:extLst>
               <a:ext uri="{91240B29-F687-4f45-9708-019B960494DF}">
-                <a14:hiddenLine xmlns:a14="http://schemas.microsoft.com/office/drawing/2010/main" xmlns="" w="9525">
+                <a14:hiddenLine xmlns="" xmlns:a14="http://schemas.microsoft.com/office/drawing/2010/main" w="9525">
                   <a:solidFill>
                     <a:srgbClr val="000000"/>
                   </a:solidFill>
@@ -1863,7 +1864,7 @@
             </a:ln>
             <a:extLst>
               <a:ext uri="{91240B29-F687-4f45-9708-019B960494DF}">
-                <a14:hiddenLine xmlns:a14="http://schemas.microsoft.com/office/drawing/2010/main" xmlns="" w="9525">
+                <a14:hiddenLine xmlns="" xmlns:a14="http://schemas.microsoft.com/office/drawing/2010/main" w="9525">
                   <a:solidFill>
                     <a:srgbClr val="000000"/>
                   </a:solidFill>
@@ -1919,7 +1920,7 @@
             </a:ln>
             <a:extLst>
               <a:ext uri="{91240B29-F687-4f45-9708-019B960494DF}">
-                <a14:hiddenLine xmlns:a14="http://schemas.microsoft.com/office/drawing/2010/main" xmlns="" w="9525">
+                <a14:hiddenLine xmlns="" xmlns:a14="http://schemas.microsoft.com/office/drawing/2010/main" w="9525">
                   <a:solidFill>
                     <a:srgbClr val="000000"/>
                   </a:solidFill>
@@ -2009,7 +2010,7 @@
             </a:ln>
             <a:extLst>
               <a:ext uri="{91240B29-F687-4f45-9708-019B960494DF}">
-                <a14:hiddenLine xmlns:a14="http://schemas.microsoft.com/office/drawing/2010/main" xmlns="" w="9525">
+                <a14:hiddenLine xmlns="" xmlns:a14="http://schemas.microsoft.com/office/drawing/2010/main" w="9525">
                   <a:solidFill>
                     <a:srgbClr val="000000"/>
                   </a:solidFill>
@@ -2077,7 +2078,7 @@
             </a:ln>
             <a:extLst>
               <a:ext uri="{91240B29-F687-4f45-9708-019B960494DF}">
-                <a14:hiddenLine xmlns:a14="http://schemas.microsoft.com/office/drawing/2010/main" xmlns="" w="9525">
+                <a14:hiddenLine xmlns="" xmlns:a14="http://schemas.microsoft.com/office/drawing/2010/main" w="9525">
                   <a:solidFill>
                     <a:srgbClr val="000000"/>
                   </a:solidFill>
@@ -2167,7 +2168,7 @@
             </a:ln>
             <a:extLst>
               <a:ext uri="{91240B29-F687-4f45-9708-019B960494DF}">
-                <a14:hiddenLine xmlns:a14="http://schemas.microsoft.com/office/drawing/2010/main" xmlns="" w="9525">
+                <a14:hiddenLine xmlns="" xmlns:a14="http://schemas.microsoft.com/office/drawing/2010/main" w="9525">
                   <a:solidFill>
                     <a:srgbClr val="000000"/>
                   </a:solidFill>
@@ -2235,7 +2236,7 @@
             </a:ln>
             <a:extLst>
               <a:ext uri="{91240B29-F687-4f45-9708-019B960494DF}">
-                <a14:hiddenLine xmlns:a14="http://schemas.microsoft.com/office/drawing/2010/main" xmlns="" w="9525">
+                <a14:hiddenLine xmlns="" xmlns:a14="http://schemas.microsoft.com/office/drawing/2010/main" w="9525">
                   <a:solidFill>
                     <a:srgbClr val="000000"/>
                   </a:solidFill>
@@ -2325,7 +2326,7 @@
             </a:ln>
             <a:extLst>
               <a:ext uri="{91240B29-F687-4f45-9708-019B960494DF}">
-                <a14:hiddenLine xmlns:a14="http://schemas.microsoft.com/office/drawing/2010/main" xmlns="" w="9525">
+                <a14:hiddenLine xmlns="" xmlns:a14="http://schemas.microsoft.com/office/drawing/2010/main" w="9525">
                   <a:solidFill>
                     <a:srgbClr val="000000"/>
                   </a:solidFill>
@@ -2359,7 +2360,7 @@
             </a:ln>
             <a:extLst>
               <a:ext uri="{91240B29-F687-4f45-9708-019B960494DF}">
-                <a14:hiddenLine xmlns:a14="http://schemas.microsoft.com/office/drawing/2010/main" xmlns="" w="9525">
+                <a14:hiddenLine xmlns="" xmlns:a14="http://schemas.microsoft.com/office/drawing/2010/main" w="9525">
                   <a:solidFill>
                     <a:srgbClr val="000000"/>
                   </a:solidFill>
@@ -2449,7 +2450,7 @@
             </a:ln>
             <a:extLst>
               <a:ext uri="{91240B29-F687-4f45-9708-019B960494DF}">
-                <a14:hiddenLine xmlns:a14="http://schemas.microsoft.com/office/drawing/2010/main" xmlns="" w="9525">
+                <a14:hiddenLine xmlns="" xmlns:a14="http://schemas.microsoft.com/office/drawing/2010/main" w="9525">
                   <a:solidFill>
                     <a:srgbClr val="000000"/>
                   </a:solidFill>
@@ -2511,7 +2512,7 @@
             </a:ln>
             <a:extLst>
               <a:ext uri="{91240B29-F687-4f45-9708-019B960494DF}">
-                <a14:hiddenLine xmlns:a14="http://schemas.microsoft.com/office/drawing/2010/main" xmlns="" w="9525">
+                <a14:hiddenLine xmlns="" xmlns:a14="http://schemas.microsoft.com/office/drawing/2010/main" w="9525">
                   <a:solidFill>
                     <a:srgbClr val="000000"/>
                   </a:solidFill>
@@ -2573,7 +2574,7 @@
             </a:ln>
             <a:extLst>
               <a:ext uri="{91240B29-F687-4f45-9708-019B960494DF}">
-                <a14:hiddenLine xmlns:a14="http://schemas.microsoft.com/office/drawing/2010/main" xmlns="" w="9525">
+                <a14:hiddenLine xmlns="" xmlns:a14="http://schemas.microsoft.com/office/drawing/2010/main" w="9525">
                   <a:solidFill>
                     <a:srgbClr val="000000"/>
                   </a:solidFill>
@@ -2663,7 +2664,7 @@
             </a:ln>
             <a:extLst>
               <a:ext uri="{91240B29-F687-4f45-9708-019B960494DF}">
-                <a14:hiddenLine xmlns:a14="http://schemas.microsoft.com/office/drawing/2010/main" xmlns="" w="9525">
+                <a14:hiddenLine xmlns="" xmlns:a14="http://schemas.microsoft.com/office/drawing/2010/main" w="9525">
                   <a:solidFill>
                     <a:srgbClr val="000000"/>
                   </a:solidFill>
@@ -2731,7 +2732,7 @@
             </a:ln>
             <a:extLst>
               <a:ext uri="{91240B29-F687-4f45-9708-019B960494DF}">
-                <a14:hiddenLine xmlns:a14="http://schemas.microsoft.com/office/drawing/2010/main" xmlns="" w="9525">
+                <a14:hiddenLine xmlns="" xmlns:a14="http://schemas.microsoft.com/office/drawing/2010/main" w="9525">
                   <a:solidFill>
                     <a:srgbClr val="000000"/>
                   </a:solidFill>
@@ -2793,7 +2794,7 @@
             </a:ln>
             <a:extLst>
               <a:ext uri="{91240B29-F687-4f45-9708-019B960494DF}">
-                <a14:hiddenLine xmlns:a14="http://schemas.microsoft.com/office/drawing/2010/main" xmlns="" w="9525">
+                <a14:hiddenLine xmlns="" xmlns:a14="http://schemas.microsoft.com/office/drawing/2010/main" w="9525">
                   <a:solidFill>
                     <a:srgbClr val="000000"/>
                   </a:solidFill>
@@ -2883,7 +2884,7 @@
             </a:ln>
             <a:extLst>
               <a:ext uri="{91240B29-F687-4f45-9708-019B960494DF}">
-                <a14:hiddenLine xmlns:a14="http://schemas.microsoft.com/office/drawing/2010/main" xmlns="" w="9525">
+                <a14:hiddenLine xmlns="" xmlns:a14="http://schemas.microsoft.com/office/drawing/2010/main" w="9525">
                   <a:solidFill>
                     <a:srgbClr val="000000"/>
                   </a:solidFill>
@@ -2945,7 +2946,7 @@
             </a:ln>
             <a:extLst>
               <a:ext uri="{91240B29-F687-4f45-9708-019B960494DF}">
-                <a14:hiddenLine xmlns:a14="http://schemas.microsoft.com/office/drawing/2010/main" xmlns="" w="9525">
+                <a14:hiddenLine xmlns="" xmlns:a14="http://schemas.microsoft.com/office/drawing/2010/main" w="9525">
                   <a:solidFill>
                     <a:srgbClr val="000000"/>
                   </a:solidFill>
@@ -3035,7 +3036,7 @@
             </a:ln>
             <a:extLst>
               <a:ext uri="{91240B29-F687-4f45-9708-019B960494DF}">
-                <a14:hiddenLine xmlns:a14="http://schemas.microsoft.com/office/drawing/2010/main" xmlns="" w="9525">
+                <a14:hiddenLine xmlns="" xmlns:a14="http://schemas.microsoft.com/office/drawing/2010/main" w="9525">
                   <a:solidFill>
                     <a:srgbClr val="000000"/>
                   </a:solidFill>
@@ -3097,7 +3098,7 @@
             </a:ln>
             <a:extLst>
               <a:ext uri="{91240B29-F687-4f45-9708-019B960494DF}">
-                <a14:hiddenLine xmlns:a14="http://schemas.microsoft.com/office/drawing/2010/main" xmlns="" w="9525">
+                <a14:hiddenLine xmlns="" xmlns:a14="http://schemas.microsoft.com/office/drawing/2010/main" w="9525">
                   <a:solidFill>
                     <a:srgbClr val="000000"/>
                   </a:solidFill>
@@ -3187,7 +3188,7 @@
             </a:ln>
             <a:extLst>
               <a:ext uri="{91240B29-F687-4f45-9708-019B960494DF}">
-                <a14:hiddenLine xmlns:a14="http://schemas.microsoft.com/office/drawing/2010/main" xmlns="" w="9525">
+                <a14:hiddenLine xmlns="" xmlns:a14="http://schemas.microsoft.com/office/drawing/2010/main" w="9525">
                   <a:solidFill>
                     <a:srgbClr val="000000"/>
                   </a:solidFill>
@@ -3221,7 +3222,7 @@
             </a:ln>
             <a:extLst>
               <a:ext uri="{91240B29-F687-4f45-9708-019B960494DF}">
-                <a14:hiddenLine xmlns:a14="http://schemas.microsoft.com/office/drawing/2010/main" xmlns="" w="9525">
+                <a14:hiddenLine xmlns="" xmlns:a14="http://schemas.microsoft.com/office/drawing/2010/main" w="9525">
                   <a:solidFill>
                     <a:srgbClr val="000000"/>
                   </a:solidFill>
@@ -3286,7 +3287,7 @@
             </a:ln>
             <a:extLst>
               <a:ext uri="{91240B29-F687-4f45-9708-019B960494DF}">
-                <a14:hiddenLine xmlns:a14="http://schemas.microsoft.com/office/drawing/2010/main" xmlns="" w="9525">
+                <a14:hiddenLine xmlns="" xmlns:a14="http://schemas.microsoft.com/office/drawing/2010/main" w="9525">
                   <a:solidFill>
                     <a:srgbClr val="000000"/>
                   </a:solidFill>
@@ -3376,7 +3377,7 @@
             </a:ln>
             <a:extLst>
               <a:ext uri="{91240B29-F687-4f45-9708-019B960494DF}">
-                <a14:hiddenLine xmlns:a14="http://schemas.microsoft.com/office/drawing/2010/main" xmlns="" w="9525">
+                <a14:hiddenLine xmlns="" xmlns:a14="http://schemas.microsoft.com/office/drawing/2010/main" w="9525">
                   <a:solidFill>
                     <a:srgbClr val="000000"/>
                   </a:solidFill>
@@ -3438,7 +3439,7 @@
             </a:ln>
             <a:extLst>
               <a:ext uri="{91240B29-F687-4f45-9708-019B960494DF}">
-                <a14:hiddenLine xmlns:a14="http://schemas.microsoft.com/office/drawing/2010/main" xmlns="" w="9525">
+                <a14:hiddenLine xmlns="" xmlns:a14="http://schemas.microsoft.com/office/drawing/2010/main" w="9525">
                   <a:solidFill>
                     <a:srgbClr val="000000"/>
                   </a:solidFill>
@@ -3528,7 +3529,7 @@
             </a:ln>
             <a:extLst>
               <a:ext uri="{91240B29-F687-4f45-9708-019B960494DF}">
-                <a14:hiddenLine xmlns:a14="http://schemas.microsoft.com/office/drawing/2010/main" xmlns="" w="9525">
+                <a14:hiddenLine xmlns="" xmlns:a14="http://schemas.microsoft.com/office/drawing/2010/main" w="9525">
                   <a:solidFill>
                     <a:srgbClr val="000000"/>
                   </a:solidFill>
@@ -3618,7 +3619,7 @@
             </a:ln>
             <a:extLst>
               <a:ext uri="{91240B29-F687-4f45-9708-019B960494DF}">
-                <a14:hiddenLine xmlns:a14="http://schemas.microsoft.com/office/drawing/2010/main" xmlns="" w="9525">
+                <a14:hiddenLine xmlns="" xmlns:a14="http://schemas.microsoft.com/office/drawing/2010/main" w="9525">
                   <a:solidFill>
                     <a:srgbClr val="000000"/>
                   </a:solidFill>
@@ -3683,7 +3684,7 @@
             </a:ln>
             <a:extLst>
               <a:ext uri="{91240B29-F687-4f45-9708-019B960494DF}">
-                <a14:hiddenLine xmlns:a14="http://schemas.microsoft.com/office/drawing/2010/main" xmlns="" w="9525">
+                <a14:hiddenLine xmlns="" xmlns:a14="http://schemas.microsoft.com/office/drawing/2010/main" w="9525">
                   <a:solidFill>
                     <a:srgbClr val="000000"/>
                   </a:solidFill>
@@ -3745,7 +3746,7 @@
             </a:ln>
             <a:extLst>
               <a:ext uri="{91240B29-F687-4f45-9708-019B960494DF}">
-                <a14:hiddenLine xmlns:a14="http://schemas.microsoft.com/office/drawing/2010/main" xmlns="" w="9525">
+                <a14:hiddenLine xmlns="" xmlns:a14="http://schemas.microsoft.com/office/drawing/2010/main" w="9525">
                   <a:solidFill>
                     <a:srgbClr val="000000"/>
                   </a:solidFill>
@@ -3835,7 +3836,7 @@
             </a:ln>
             <a:extLst>
               <a:ext uri="{91240B29-F687-4f45-9708-019B960494DF}">
-                <a14:hiddenLine xmlns:a14="http://schemas.microsoft.com/office/drawing/2010/main" xmlns="" w="9525">
+                <a14:hiddenLine xmlns="" xmlns:a14="http://schemas.microsoft.com/office/drawing/2010/main" w="9525">
                   <a:solidFill>
                     <a:srgbClr val="000000"/>
                   </a:solidFill>
@@ -3925,7 +3926,7 @@
             </a:ln>
             <a:extLst>
               <a:ext uri="{91240B29-F687-4f45-9708-019B960494DF}">
-                <a14:hiddenLine xmlns:a14="http://schemas.microsoft.com/office/drawing/2010/main" xmlns="" w="9525">
+                <a14:hiddenLine xmlns="" xmlns:a14="http://schemas.microsoft.com/office/drawing/2010/main" w="9525">
                   <a:solidFill>
                     <a:srgbClr val="000000"/>
                   </a:solidFill>
@@ -3987,7 +3988,7 @@
             </a:ln>
             <a:extLst>
               <a:ext uri="{91240B29-F687-4f45-9708-019B960494DF}">
-                <a14:hiddenLine xmlns:a14="http://schemas.microsoft.com/office/drawing/2010/main" xmlns="" w="9525">
+                <a14:hiddenLine xmlns="" xmlns:a14="http://schemas.microsoft.com/office/drawing/2010/main" w="9525">
                   <a:solidFill>
                     <a:srgbClr val="000000"/>
                   </a:solidFill>
@@ -4107,7 +4108,7 @@
             </a:ln>
             <a:extLst>
               <a:ext uri="{91240B29-F687-4f45-9708-019B960494DF}">
-                <a14:hiddenLine xmlns:a14="http://schemas.microsoft.com/office/drawing/2010/main" xmlns="" w="9525">
+                <a14:hiddenLine xmlns="" xmlns:a14="http://schemas.microsoft.com/office/drawing/2010/main" w="9525">
                   <a:solidFill>
                     <a:srgbClr val="000000"/>
                   </a:solidFill>
@@ -4175,7 +4176,7 @@
             </a:ln>
             <a:extLst>
               <a:ext uri="{91240B29-F687-4f45-9708-019B960494DF}">
-                <a14:hiddenLine xmlns:a14="http://schemas.microsoft.com/office/drawing/2010/main" xmlns="" w="9525">
+                <a14:hiddenLine xmlns="" xmlns:a14="http://schemas.microsoft.com/office/drawing/2010/main" w="9525">
                   <a:solidFill>
                     <a:srgbClr val="000000"/>
                   </a:solidFill>
@@ -4265,7 +4266,7 @@
             </a:ln>
             <a:extLst>
               <a:ext uri="{91240B29-F687-4f45-9708-019B960494DF}">
-                <a14:hiddenLine xmlns:a14="http://schemas.microsoft.com/office/drawing/2010/main" xmlns="" w="9525">
+                <a14:hiddenLine xmlns="" xmlns:a14="http://schemas.microsoft.com/office/drawing/2010/main" w="9525">
                   <a:solidFill>
                     <a:srgbClr val="000000"/>
                   </a:solidFill>
@@ -9072,7 +9073,7 @@
           <a:noFill/>
           <a:extLst>
             <a:ext uri="{909E8E84-426E-40dd-AFC4-6F175D3DCCD1}">
-              <a14:hiddenFill xmlns:a14="http://schemas.microsoft.com/office/drawing/2010/main" xmlns="">
+              <a14:hiddenFill xmlns="" xmlns:a14="http://schemas.microsoft.com/office/drawing/2010/main">
                 <a:solidFill>
                   <a:srgbClr val="FFFFFF"/>
                 </a:solidFill>
@@ -9146,7 +9147,7 @@
               </a:ln>
               <a:extLst>
                 <a:ext uri="{91240B29-F687-4f45-9708-019B960494DF}">
-                  <a14:hiddenLine xmlns:a14="http://schemas.microsoft.com/office/drawing/2010/main" xmlns="" w="9525">
+                  <a14:hiddenLine xmlns="" xmlns:a14="http://schemas.microsoft.com/office/drawing/2010/main" w="9525">
                     <a:solidFill>
                       <a:srgbClr val="000000"/>
                     </a:solidFill>
@@ -9236,7 +9237,7 @@
               </a:ln>
               <a:extLst>
                 <a:ext uri="{91240B29-F687-4f45-9708-019B960494DF}">
-                  <a14:hiddenLine xmlns:a14="http://schemas.microsoft.com/office/drawing/2010/main" xmlns="" w="9525">
+                  <a14:hiddenLine xmlns="" xmlns:a14="http://schemas.microsoft.com/office/drawing/2010/main" w="9525">
                     <a:solidFill>
                       <a:srgbClr val="000000"/>
                     </a:solidFill>
@@ -9326,7 +9327,7 @@
               </a:ln>
               <a:extLst>
                 <a:ext uri="{91240B29-F687-4f45-9708-019B960494DF}">
-                  <a14:hiddenLine xmlns:a14="http://schemas.microsoft.com/office/drawing/2010/main" xmlns="" w="9525">
+                  <a14:hiddenLine xmlns="" xmlns:a14="http://schemas.microsoft.com/office/drawing/2010/main" w="9525">
                     <a:solidFill>
                       <a:srgbClr val="000000"/>
                     </a:solidFill>
@@ -9388,7 +9389,7 @@
               </a:ln>
               <a:extLst>
                 <a:ext uri="{91240B29-F687-4f45-9708-019B960494DF}">
-                  <a14:hiddenLine xmlns:a14="http://schemas.microsoft.com/office/drawing/2010/main" xmlns="" w="9525">
+                  <a14:hiddenLine xmlns="" xmlns:a14="http://schemas.microsoft.com/office/drawing/2010/main" w="9525">
                     <a:solidFill>
                       <a:srgbClr val="000000"/>
                     </a:solidFill>
@@ -9478,7 +9479,7 @@
               </a:ln>
               <a:extLst>
                 <a:ext uri="{91240B29-F687-4f45-9708-019B960494DF}">
-                  <a14:hiddenLine xmlns:a14="http://schemas.microsoft.com/office/drawing/2010/main" xmlns="" w="9525">
+                  <a14:hiddenLine xmlns="" xmlns:a14="http://schemas.microsoft.com/office/drawing/2010/main" w="9525">
                     <a:solidFill>
                       <a:srgbClr val="000000"/>
                     </a:solidFill>
@@ -9540,7 +9541,7 @@
               </a:ln>
               <a:extLst>
                 <a:ext uri="{91240B29-F687-4f45-9708-019B960494DF}">
-                  <a14:hiddenLine xmlns:a14="http://schemas.microsoft.com/office/drawing/2010/main" xmlns="" w="9525">
+                  <a14:hiddenLine xmlns="" xmlns:a14="http://schemas.microsoft.com/office/drawing/2010/main" w="9525">
                     <a:solidFill>
                       <a:srgbClr val="000000"/>
                     </a:solidFill>
@@ -9602,7 +9603,7 @@
               </a:ln>
               <a:extLst>
                 <a:ext uri="{91240B29-F687-4f45-9708-019B960494DF}">
-                  <a14:hiddenLine xmlns:a14="http://schemas.microsoft.com/office/drawing/2010/main" xmlns="" w="9525">
+                  <a14:hiddenLine xmlns="" xmlns:a14="http://schemas.microsoft.com/office/drawing/2010/main" w="9525">
                     <a:solidFill>
                       <a:srgbClr val="000000"/>
                     </a:solidFill>
@@ -9692,7 +9693,7 @@
               </a:ln>
               <a:extLst>
                 <a:ext uri="{91240B29-F687-4f45-9708-019B960494DF}">
-                  <a14:hiddenLine xmlns:a14="http://schemas.microsoft.com/office/drawing/2010/main" xmlns="" w="9525">
+                  <a14:hiddenLine xmlns="" xmlns:a14="http://schemas.microsoft.com/office/drawing/2010/main" w="9525">
                     <a:solidFill>
                       <a:srgbClr val="000000"/>
                     </a:solidFill>
@@ -9782,7 +9783,7 @@
               </a:ln>
               <a:extLst>
                 <a:ext uri="{91240B29-F687-4f45-9708-019B960494DF}">
-                  <a14:hiddenLine xmlns:a14="http://schemas.microsoft.com/office/drawing/2010/main" xmlns="" w="9525">
+                  <a14:hiddenLine xmlns="" xmlns:a14="http://schemas.microsoft.com/office/drawing/2010/main" w="9525">
                     <a:solidFill>
                       <a:srgbClr val="000000"/>
                     </a:solidFill>
@@ -9844,7 +9845,7 @@
               </a:ln>
               <a:extLst>
                 <a:ext uri="{91240B29-F687-4f45-9708-019B960494DF}">
-                  <a14:hiddenLine xmlns:a14="http://schemas.microsoft.com/office/drawing/2010/main" xmlns="" w="9525">
+                  <a14:hiddenLine xmlns="" xmlns:a14="http://schemas.microsoft.com/office/drawing/2010/main" w="9525">
                     <a:solidFill>
                       <a:srgbClr val="000000"/>
                     </a:solidFill>
@@ -9954,7 +9955,7 @@
               </a:ln>
               <a:extLst>
                 <a:ext uri="{91240B29-F687-4f45-9708-019B960494DF}">
-                  <a14:hiddenLine xmlns:a14="http://schemas.microsoft.com/office/drawing/2010/main" xmlns="" w="9525">
+                  <a14:hiddenLine xmlns="" xmlns:a14="http://schemas.microsoft.com/office/drawing/2010/main" w="9525">
                     <a:solidFill>
                       <a:srgbClr val="000000"/>
                     </a:solidFill>
@@ -10038,7 +10039,7 @@
               </a:ln>
               <a:extLst>
                 <a:ext uri="{91240B29-F687-4f45-9708-019B960494DF}">
-                  <a14:hiddenLine xmlns:a14="http://schemas.microsoft.com/office/drawing/2010/main" xmlns="" w="9525">
+                  <a14:hiddenLine xmlns="" xmlns:a14="http://schemas.microsoft.com/office/drawing/2010/main" w="9525">
                     <a:solidFill>
                       <a:srgbClr val="000000"/>
                     </a:solidFill>
@@ -10100,7 +10101,7 @@
               </a:ln>
               <a:extLst>
                 <a:ext uri="{91240B29-F687-4f45-9708-019B960494DF}">
-                  <a14:hiddenLine xmlns:a14="http://schemas.microsoft.com/office/drawing/2010/main" xmlns="" w="9525">
+                  <a14:hiddenLine xmlns="" xmlns:a14="http://schemas.microsoft.com/office/drawing/2010/main" w="9525">
                     <a:solidFill>
                       <a:srgbClr val="000000"/>
                     </a:solidFill>
@@ -10162,7 +10163,7 @@
               </a:ln>
               <a:extLst>
                 <a:ext uri="{91240B29-F687-4f45-9708-019B960494DF}">
-                  <a14:hiddenLine xmlns:a14="http://schemas.microsoft.com/office/drawing/2010/main" xmlns="" w="9525">
+                  <a14:hiddenLine xmlns="" xmlns:a14="http://schemas.microsoft.com/office/drawing/2010/main" w="9525">
                     <a:solidFill>
                       <a:srgbClr val="000000"/>
                     </a:solidFill>
@@ -10252,7 +10253,7 @@
               </a:ln>
               <a:extLst>
                 <a:ext uri="{91240B29-F687-4f45-9708-019B960494DF}">
-                  <a14:hiddenLine xmlns:a14="http://schemas.microsoft.com/office/drawing/2010/main" xmlns="" w="9525">
+                  <a14:hiddenLine xmlns="" xmlns:a14="http://schemas.microsoft.com/office/drawing/2010/main" w="9525">
                     <a:solidFill>
                       <a:srgbClr val="000000"/>
                     </a:solidFill>
@@ -10286,7 +10287,7 @@
               </a:ln>
               <a:extLst>
                 <a:ext uri="{91240B29-F687-4f45-9708-019B960494DF}">
-                  <a14:hiddenLine xmlns:a14="http://schemas.microsoft.com/office/drawing/2010/main" xmlns="" w="9525">
+                  <a14:hiddenLine xmlns="" xmlns:a14="http://schemas.microsoft.com/office/drawing/2010/main" w="9525">
                     <a:solidFill>
                       <a:srgbClr val="000000"/>
                     </a:solidFill>
@@ -10351,7 +10352,7 @@
               </a:ln>
               <a:extLst>
                 <a:ext uri="{91240B29-F687-4f45-9708-019B960494DF}">
-                  <a14:hiddenLine xmlns:a14="http://schemas.microsoft.com/office/drawing/2010/main" xmlns="" w="9525">
+                  <a14:hiddenLine xmlns="" xmlns:a14="http://schemas.microsoft.com/office/drawing/2010/main" w="9525">
                     <a:solidFill>
                       <a:srgbClr val="000000"/>
                     </a:solidFill>
@@ -10441,7 +10442,7 @@
               </a:ln>
               <a:extLst>
                 <a:ext uri="{91240B29-F687-4f45-9708-019B960494DF}">
-                  <a14:hiddenLine xmlns:a14="http://schemas.microsoft.com/office/drawing/2010/main" xmlns="" w="9525">
+                  <a14:hiddenLine xmlns="" xmlns:a14="http://schemas.microsoft.com/office/drawing/2010/main" w="9525">
                     <a:solidFill>
                       <a:srgbClr val="000000"/>
                     </a:solidFill>
@@ -10503,7 +10504,7 @@
               </a:ln>
               <a:extLst>
                 <a:ext uri="{91240B29-F687-4f45-9708-019B960494DF}">
-                  <a14:hiddenLine xmlns:a14="http://schemas.microsoft.com/office/drawing/2010/main" xmlns="" w="9525">
+                  <a14:hiddenLine xmlns="" xmlns:a14="http://schemas.microsoft.com/office/drawing/2010/main" w="9525">
                     <a:solidFill>
                       <a:srgbClr val="000000"/>
                     </a:solidFill>
@@ -10593,7 +10594,7 @@
               </a:ln>
               <a:extLst>
                 <a:ext uri="{91240B29-F687-4f45-9708-019B960494DF}">
-                  <a14:hiddenLine xmlns:a14="http://schemas.microsoft.com/office/drawing/2010/main" xmlns="" w="9525">
+                  <a14:hiddenLine xmlns="" xmlns:a14="http://schemas.microsoft.com/office/drawing/2010/main" w="9525">
                     <a:solidFill>
                       <a:srgbClr val="000000"/>
                     </a:solidFill>
@@ -10658,7 +10659,7 @@
               </a:ln>
               <a:extLst>
                 <a:ext uri="{91240B29-F687-4f45-9708-019B960494DF}">
-                  <a14:hiddenLine xmlns:a14="http://schemas.microsoft.com/office/drawing/2010/main" xmlns="" w="9525">
+                  <a14:hiddenLine xmlns="" xmlns:a14="http://schemas.microsoft.com/office/drawing/2010/main" w="9525">
                     <a:solidFill>
                       <a:srgbClr val="000000"/>
                     </a:solidFill>
@@ -10720,7 +10721,7 @@
               </a:ln>
               <a:extLst>
                 <a:ext uri="{91240B29-F687-4f45-9708-019B960494DF}">
-                  <a14:hiddenLine xmlns:a14="http://schemas.microsoft.com/office/drawing/2010/main" xmlns="" w="9525">
+                  <a14:hiddenLine xmlns="" xmlns:a14="http://schemas.microsoft.com/office/drawing/2010/main" w="9525">
                     <a:solidFill>
                       <a:srgbClr val="000000"/>
                     </a:solidFill>
@@ -10810,7 +10811,7 @@
               </a:ln>
               <a:extLst>
                 <a:ext uri="{91240B29-F687-4f45-9708-019B960494DF}">
-                  <a14:hiddenLine xmlns:a14="http://schemas.microsoft.com/office/drawing/2010/main" xmlns="" w="9525">
+                  <a14:hiddenLine xmlns="" xmlns:a14="http://schemas.microsoft.com/office/drawing/2010/main" w="9525">
                     <a:solidFill>
                       <a:srgbClr val="000000"/>
                     </a:solidFill>
@@ -10900,7 +10901,7 @@
               </a:ln>
               <a:extLst>
                 <a:ext uri="{91240B29-F687-4f45-9708-019B960494DF}">
-                  <a14:hiddenLine xmlns:a14="http://schemas.microsoft.com/office/drawing/2010/main" xmlns="" w="9525">
+                  <a14:hiddenLine xmlns="" xmlns:a14="http://schemas.microsoft.com/office/drawing/2010/main" w="9525">
                     <a:solidFill>
                       <a:srgbClr val="000000"/>
                     </a:solidFill>
@@ -10965,7 +10966,7 @@
               </a:ln>
               <a:extLst>
                 <a:ext uri="{91240B29-F687-4f45-9708-019B960494DF}">
-                  <a14:hiddenLine xmlns:a14="http://schemas.microsoft.com/office/drawing/2010/main" xmlns="" w="9525">
+                  <a14:hiddenLine xmlns="" xmlns:a14="http://schemas.microsoft.com/office/drawing/2010/main" w="9525">
                     <a:solidFill>
                       <a:srgbClr val="000000"/>
                     </a:solidFill>
@@ -11085,7 +11086,7 @@
               </a:ln>
               <a:extLst>
                 <a:ext uri="{91240B29-F687-4f45-9708-019B960494DF}">
-                  <a14:hiddenLine xmlns:a14="http://schemas.microsoft.com/office/drawing/2010/main" xmlns="" w="9525">
+                  <a14:hiddenLine xmlns="" xmlns:a14="http://schemas.microsoft.com/office/drawing/2010/main" w="9525">
                     <a:solidFill>
                       <a:srgbClr val="000000"/>
                     </a:solidFill>
@@ -11183,7 +11184,7 @@
               </a:ln>
               <a:extLst>
                 <a:ext uri="{91240B29-F687-4f45-9708-019B960494DF}">
-                  <a14:hiddenLine xmlns:a14="http://schemas.microsoft.com/office/drawing/2010/main" xmlns="" w="9525">
+                  <a14:hiddenLine xmlns="" xmlns:a14="http://schemas.microsoft.com/office/drawing/2010/main" w="9525">
                     <a:solidFill>
                       <a:srgbClr val="000000"/>
                     </a:solidFill>
@@ -11298,7 +11299,7 @@
               </a:ln>
               <a:extLst>
                 <a:ext uri="{91240B29-F687-4f45-9708-019B960494DF}">
-                  <a14:hiddenLine xmlns:a14="http://schemas.microsoft.com/office/drawing/2010/main" xmlns="" w="9525">
+                  <a14:hiddenLine xmlns="" xmlns:a14="http://schemas.microsoft.com/office/drawing/2010/main" w="9525">
                     <a:solidFill>
                       <a:srgbClr val="000000"/>
                     </a:solidFill>
@@ -11388,7 +11389,7 @@
               </a:ln>
               <a:extLst>
                 <a:ext uri="{91240B29-F687-4f45-9708-019B960494DF}">
-                  <a14:hiddenLine xmlns:a14="http://schemas.microsoft.com/office/drawing/2010/main" xmlns="" w="9525">
+                  <a14:hiddenLine xmlns="" xmlns:a14="http://schemas.microsoft.com/office/drawing/2010/main" w="9525">
                     <a:solidFill>
                       <a:srgbClr val="000000"/>
                     </a:solidFill>
@@ -11453,7 +11454,7 @@
               </a:ln>
               <a:extLst>
                 <a:ext uri="{91240B29-F687-4f45-9708-019B960494DF}">
-                  <a14:hiddenLine xmlns:a14="http://schemas.microsoft.com/office/drawing/2010/main" xmlns="" w="9525">
+                  <a14:hiddenLine xmlns="" xmlns:a14="http://schemas.microsoft.com/office/drawing/2010/main" w="9525">
                     <a:solidFill>
                       <a:srgbClr val="000000"/>
                     </a:solidFill>
@@ -11543,7 +11544,7 @@
               </a:ln>
               <a:extLst>
                 <a:ext uri="{91240B29-F687-4f45-9708-019B960494DF}">
-                  <a14:hiddenLine xmlns:a14="http://schemas.microsoft.com/office/drawing/2010/main" xmlns="" w="9525">
+                  <a14:hiddenLine xmlns="" xmlns:a14="http://schemas.microsoft.com/office/drawing/2010/main" w="9525">
                     <a:solidFill>
                       <a:srgbClr val="000000"/>
                     </a:solidFill>
@@ -11611,7 +11612,7 @@
               </a:ln>
               <a:extLst>
                 <a:ext uri="{91240B29-F687-4f45-9708-019B960494DF}">
-                  <a14:hiddenLine xmlns:a14="http://schemas.microsoft.com/office/drawing/2010/main" xmlns="" w="9525">
+                  <a14:hiddenLine xmlns="" xmlns:a14="http://schemas.microsoft.com/office/drawing/2010/main" w="9525">
                     <a:solidFill>
                       <a:srgbClr val="000000"/>
                     </a:solidFill>
@@ -11701,7 +11702,7 @@
               </a:ln>
               <a:extLst>
                 <a:ext uri="{91240B29-F687-4f45-9708-019B960494DF}">
-                  <a14:hiddenLine xmlns:a14="http://schemas.microsoft.com/office/drawing/2010/main" xmlns="" w="9525">
+                  <a14:hiddenLine xmlns="" xmlns:a14="http://schemas.microsoft.com/office/drawing/2010/main" w="9525">
                     <a:solidFill>
                       <a:srgbClr val="000000"/>
                     </a:solidFill>
@@ -11769,7 +11770,7 @@
               </a:ln>
               <a:extLst>
                 <a:ext uri="{91240B29-F687-4f45-9708-019B960494DF}">
-                  <a14:hiddenLine xmlns:a14="http://schemas.microsoft.com/office/drawing/2010/main" xmlns="" w="9525">
+                  <a14:hiddenLine xmlns="" xmlns:a14="http://schemas.microsoft.com/office/drawing/2010/main" w="9525">
                     <a:solidFill>
                       <a:srgbClr val="000000"/>
                     </a:solidFill>
@@ -11859,7 +11860,7 @@
               </a:ln>
               <a:extLst>
                 <a:ext uri="{91240B29-F687-4f45-9708-019B960494DF}">
-                  <a14:hiddenLine xmlns:a14="http://schemas.microsoft.com/office/drawing/2010/main" xmlns="" w="9525">
+                  <a14:hiddenLine xmlns="" xmlns:a14="http://schemas.microsoft.com/office/drawing/2010/main" w="9525">
                     <a:solidFill>
                       <a:srgbClr val="000000"/>
                     </a:solidFill>
@@ -11893,7 +11894,7 @@
               </a:ln>
               <a:extLst>
                 <a:ext uri="{91240B29-F687-4f45-9708-019B960494DF}">
-                  <a14:hiddenLine xmlns:a14="http://schemas.microsoft.com/office/drawing/2010/main" xmlns="" w="9525">
+                  <a14:hiddenLine xmlns="" xmlns:a14="http://schemas.microsoft.com/office/drawing/2010/main" w="9525">
                     <a:solidFill>
                       <a:srgbClr val="000000"/>
                     </a:solidFill>
@@ -12471,7 +12472,7 @@
         </p:nvSpPr>
         <p:spPr>
           <a:xfrm>
-            <a:off x="930442" y="1122363"/>
+            <a:off x="930442" y="458220"/>
             <a:ext cx="10331116" cy="1139574"/>
           </a:xfrm>
         </p:spPr>
@@ -12945,7 +12946,7 @@
         </p:spPr>
         <p:txBody>
           <a:bodyPr>
-            <a:normAutofit fontScale="85000" lnSpcReduction="20000"/>
+            <a:normAutofit fontScale="92500" lnSpcReduction="20000"/>
           </a:bodyPr>
           <a:lstStyle/>
           <a:p>
@@ -12963,7 +12964,7 @@
           <a:p>
             <a:r>
               <a:rPr lang="en-US" dirty="0"/>
-              <a:t>TF-IDF weighting was applied to emphasize key terms within text chunks, and FAISS indexing was integrated to enable faster and more accurate similarity searches, after which the model was re-evaluated to confirm improved retrieval performance.</a:t>
+              <a:t>FAISS indexing was integrated to enable faster and more accurate similarity searches, after which the model was re-evaluated to confirm improved retrieval performance.</a:t>
             </a:r>
           </a:p>
           <a:p>
@@ -12973,12 +12974,9 @@
             <a:endParaRPr lang="en-US" dirty="0"/>
           </a:p>
           <a:p>
-            <a:endParaRPr lang="en-US" dirty="0"/>
-          </a:p>
-          <a:p>
             <a:r>
               <a:rPr lang="en-US" dirty="0"/>
-              <a:t>The recall, which is the primary evaluation metric for this project, improved from 0.56 to 0.64 after introducing weighting.</a:t>
+              <a:t>The recall, which is the primary evaluation metric for this project, improved from 0.56 to 0.73 after introducing FAISS Indexing to the MiniLM model.</a:t>
             </a:r>
           </a:p>
           <a:p>
@@ -13004,7 +13002,7 @@
           <p:nvPr>
             <p:extLst>
               <p:ext uri="{D42A27DB-BD31-4B8C-83A1-F6EECF244321}">
-                <p14:modId xmlns:p14="http://schemas.microsoft.com/office/powerpoint/2010/main" val="3808407634"/>
+                <p14:modId xmlns:p14="http://schemas.microsoft.com/office/powerpoint/2010/main" val="584187045"/>
               </p:ext>
             </p:extLst>
           </p:nvPr>
@@ -13054,7 +13052,11 @@
                       </a:r>
                     </a:p>
                   </a:txBody>
-                  <a:tcPr/>
+                  <a:tcPr>
+                    <a:solidFill>
+                      <a:schemeClr val="bg2"/>
+                    </a:solidFill>
+                  </a:tcPr>
                 </a:tc>
                 <a:tc>
                   <a:txBody>
@@ -13067,7 +13069,11 @@
                       </a:r>
                     </a:p>
                   </a:txBody>
-                  <a:tcPr/>
+                  <a:tcPr>
+                    <a:solidFill>
+                      <a:schemeClr val="bg2"/>
+                    </a:solidFill>
+                  </a:tcPr>
                 </a:tc>
                 <a:tc>
                   <a:txBody>
@@ -13080,7 +13086,11 @@
                       </a:r>
                     </a:p>
                   </a:txBody>
-                  <a:tcPr/>
+                  <a:tcPr>
+                    <a:solidFill>
+                      <a:schemeClr val="bg2"/>
+                    </a:solidFill>
+                  </a:tcPr>
                 </a:tc>
                 <a:extLst>
                   <a:ext uri="{0D108BD9-81ED-4DB2-BD59-A6C34878D82A}">
@@ -13153,13 +13163,13 @@
           <p:nvPr>
             <p:extLst>
               <p:ext uri="{D42A27DB-BD31-4B8C-83A1-F6EECF244321}">
-                <p14:modId xmlns:p14="http://schemas.microsoft.com/office/powerpoint/2010/main" val="3352120447"/>
+                <p14:modId xmlns:p14="http://schemas.microsoft.com/office/powerpoint/2010/main" val="2283777387"/>
               </p:ext>
             </p:extLst>
           </p:nvPr>
         </p:nvGraphicFramePr>
         <p:xfrm>
-          <a:off x="539014" y="4001435"/>
+          <a:off x="722964" y="3748983"/>
           <a:ext cx="8127999" cy="741680"/>
         </p:xfrm>
         <a:graphic>
@@ -13203,7 +13213,11 @@
                       </a:r>
                     </a:p>
                   </a:txBody>
-                  <a:tcPr/>
+                  <a:tcPr>
+                    <a:solidFill>
+                      <a:schemeClr val="bg2"/>
+                    </a:solidFill>
+                  </a:tcPr>
                 </a:tc>
                 <a:tc>
                   <a:txBody>
@@ -13216,7 +13230,11 @@
                       </a:r>
                     </a:p>
                   </a:txBody>
-                  <a:tcPr/>
+                  <a:tcPr>
+                    <a:solidFill>
+                      <a:schemeClr val="bg2"/>
+                    </a:solidFill>
+                  </a:tcPr>
                 </a:tc>
                 <a:tc>
                   <a:txBody>
@@ -13229,7 +13247,11 @@
                       </a:r>
                     </a:p>
                   </a:txBody>
-                  <a:tcPr/>
+                  <a:tcPr>
+                    <a:solidFill>
+                      <a:schemeClr val="bg2"/>
+                    </a:solidFill>
+                  </a:tcPr>
                 </a:tc>
                 <a:extLst>
                   <a:ext uri="{0D108BD9-81ED-4DB2-BD59-A6C34878D82A}">
@@ -13322,6 +13344,295 @@
           <p:cNvPr id="2" name="Title 1">
             <a:extLst>
               <a:ext uri="{FF2B5EF4-FFF2-40B4-BE49-F238E27FC236}">
+                <a16:creationId xmlns:a16="http://schemas.microsoft.com/office/drawing/2014/main" id="{FE3D2820-A67A-45F7-9D6D-1E59FCAEB5E1}"/>
+              </a:ext>
+            </a:extLst>
+          </p:cNvPr>
+          <p:cNvSpPr>
+            <a:spLocks noGrp="1"/>
+          </p:cNvSpPr>
+          <p:nvPr>
+            <p:ph type="title"/>
+          </p:nvPr>
+        </p:nvSpPr>
+        <p:spPr>
+          <a:xfrm>
+            <a:off x="1141412" y="327260"/>
+            <a:ext cx="9905999" cy="1097280"/>
+          </a:xfrm>
+        </p:spPr>
+        <p:txBody>
+          <a:bodyPr/>
+          <a:lstStyle/>
+          <a:p>
+            <a:r>
+              <a:rPr lang="en-US" dirty="0"/>
+              <a:t>    </a:t>
+            </a:r>
+            <a:r>
+              <a:rPr lang="en-US" sz="5400" b="1" dirty="0"/>
+              <a:t>Model Evaluation </a:t>
+            </a:r>
+            <a:r>
+              <a:rPr lang="en-US" sz="5400" b="1" dirty="0" err="1"/>
+              <a:t>cont</a:t>
+            </a:r>
+            <a:endParaRPr lang="en-US" b="1" dirty="0"/>
+          </a:p>
+        </p:txBody>
+      </p:sp>
+      <p:sp>
+        <p:nvSpPr>
+          <p:cNvPr id="3" name="Content Placeholder 2">
+            <a:extLst>
+              <a:ext uri="{FF2B5EF4-FFF2-40B4-BE49-F238E27FC236}">
+                <a16:creationId xmlns:a16="http://schemas.microsoft.com/office/drawing/2014/main" id="{B64841F3-C72A-4437-9E89-446A08B86397}"/>
+              </a:ext>
+            </a:extLst>
+          </p:cNvPr>
+          <p:cNvSpPr>
+            <a:spLocks noGrp="1"/>
+          </p:cNvSpPr>
+          <p:nvPr>
+            <p:ph idx="1"/>
+          </p:nvPr>
+        </p:nvSpPr>
+        <p:spPr>
+          <a:xfrm>
+            <a:off x="539014" y="1132956"/>
+            <a:ext cx="11540691" cy="5397784"/>
+          </a:xfrm>
+        </p:spPr>
+        <p:txBody>
+          <a:bodyPr>
+            <a:normAutofit/>
+          </a:bodyPr>
+          <a:lstStyle/>
+          <a:p>
+            <a:r>
+              <a:rPr lang="en-US" dirty="0"/>
+              <a:t>TF-IDF weighting was then applied to the base MiniLM model to enhance text relevance scoring, after which the model was re-evaluated for performance improvements.</a:t>
+            </a:r>
+          </a:p>
+          <a:p>
+            <a:pPr marL="0" indent="0">
+              <a:buNone/>
+            </a:pPr>
+            <a:endParaRPr lang="en-US" dirty="0"/>
+          </a:p>
+          <a:p>
+            <a:endParaRPr lang="en-US" dirty="0"/>
+          </a:p>
+          <a:p>
+            <a:r>
+              <a:rPr lang="en-US" dirty="0"/>
+              <a:t>The model outperformed the base model alone but ranked second to the combination of the base model with FAISS indexing, as shown in the earlier table.</a:t>
+            </a:r>
+          </a:p>
+          <a:p>
+            <a:r>
+              <a:rPr lang="en-US" dirty="0"/>
+              <a:t>This highlighted a recall–precision tradeoff, where the chosen model’s precision dropped from 0.61 to 0.43 compared to the TF-IDF–enhanced model, despite achieving higher recall.</a:t>
+            </a:r>
+          </a:p>
+        </p:txBody>
+      </p:sp>
+      <p:graphicFrame>
+        <p:nvGraphicFramePr>
+          <p:cNvPr id="4" name="Table 4">
+            <a:extLst>
+              <a:ext uri="{FF2B5EF4-FFF2-40B4-BE49-F238E27FC236}">
+                <a16:creationId xmlns:a16="http://schemas.microsoft.com/office/drawing/2014/main" id="{D11B85EE-5551-455A-90AE-4F0D88F7C201}"/>
+              </a:ext>
+            </a:extLst>
+          </p:cNvPr>
+          <p:cNvGraphicFramePr>
+            <a:graphicFrameLocks noGrp="1"/>
+          </p:cNvGraphicFramePr>
+          <p:nvPr>
+            <p:extLst>
+              <p:ext uri="{D42A27DB-BD31-4B8C-83A1-F6EECF244321}">
+                <p14:modId xmlns:p14="http://schemas.microsoft.com/office/powerpoint/2010/main" val="491835338"/>
+              </p:ext>
+            </p:extLst>
+          </p:nvPr>
+        </p:nvGraphicFramePr>
+        <p:xfrm>
+          <a:off x="835259" y="2370547"/>
+          <a:ext cx="8127999" cy="736600"/>
+        </p:xfrm>
+        <a:graphic>
+          <a:graphicData uri="http://schemas.openxmlformats.org/drawingml/2006/table">
+            <a:tbl>
+              <a:tblPr firstRow="1" bandRow="1">
+                <a:tableStyleId>{5C22544A-7EE6-4342-B048-85BDC9FD1C3A}</a:tableStyleId>
+              </a:tblPr>
+              <a:tblGrid>
+                <a:gridCol w="2709333">
+                  <a:extLst>
+                    <a:ext uri="{9D8B030D-6E8A-4147-A177-3AD203B41FA5}">
+                      <a16:colId xmlns:a16="http://schemas.microsoft.com/office/drawing/2014/main" val="2129289966"/>
+                    </a:ext>
+                  </a:extLst>
+                </a:gridCol>
+                <a:gridCol w="2709333">
+                  <a:extLst>
+                    <a:ext uri="{9D8B030D-6E8A-4147-A177-3AD203B41FA5}">
+                      <a16:colId xmlns:a16="http://schemas.microsoft.com/office/drawing/2014/main" val="1298710464"/>
+                    </a:ext>
+                  </a:extLst>
+                </a:gridCol>
+                <a:gridCol w="2709333">
+                  <a:extLst>
+                    <a:ext uri="{9D8B030D-6E8A-4147-A177-3AD203B41FA5}">
+                      <a16:colId xmlns:a16="http://schemas.microsoft.com/office/drawing/2014/main" val="1270550358"/>
+                    </a:ext>
+                  </a:extLst>
+                </a:gridCol>
+              </a:tblGrid>
+              <a:tr h="0">
+                <a:tc>
+                  <a:txBody>
+                    <a:bodyPr/>
+                    <a:lstStyle/>
+                    <a:p>
+                      <a:r>
+                        <a:rPr lang="en-US" dirty="0"/>
+                        <a:t>Recall</a:t>
+                      </a:r>
+                    </a:p>
+                  </a:txBody>
+                  <a:tcPr>
+                    <a:solidFill>
+                      <a:schemeClr val="bg2"/>
+                    </a:solidFill>
+                  </a:tcPr>
+                </a:tc>
+                <a:tc>
+                  <a:txBody>
+                    <a:bodyPr/>
+                    <a:lstStyle/>
+                    <a:p>
+                      <a:r>
+                        <a:rPr lang="en-US" dirty="0"/>
+                        <a:t>Precision</a:t>
+                      </a:r>
+                    </a:p>
+                  </a:txBody>
+                  <a:tcPr>
+                    <a:solidFill>
+                      <a:schemeClr val="bg2"/>
+                    </a:solidFill>
+                  </a:tcPr>
+                </a:tc>
+                <a:tc>
+                  <a:txBody>
+                    <a:bodyPr/>
+                    <a:lstStyle/>
+                    <a:p>
+                      <a:r>
+                        <a:rPr lang="en-US" dirty="0"/>
+                        <a:t>Mean Reciprocal Rank</a:t>
+                      </a:r>
+                    </a:p>
+                  </a:txBody>
+                  <a:tcPr>
+                    <a:solidFill>
+                      <a:schemeClr val="bg2"/>
+                    </a:solidFill>
+                  </a:tcPr>
+                </a:tc>
+                <a:extLst>
+                  <a:ext uri="{0D108BD9-81ED-4DB2-BD59-A6C34878D82A}">
+                    <a16:rowId xmlns:a16="http://schemas.microsoft.com/office/drawing/2014/main" val="2669151626"/>
+                  </a:ext>
+                </a:extLst>
+              </a:tr>
+              <a:tr h="370840">
+                <a:tc>
+                  <a:txBody>
+                    <a:bodyPr/>
+                    <a:lstStyle/>
+                    <a:p>
+                      <a:r>
+                        <a:rPr lang="en-US" dirty="0"/>
+                        <a:t>0.64</a:t>
+                      </a:r>
+                    </a:p>
+                  </a:txBody>
+                  <a:tcPr/>
+                </a:tc>
+                <a:tc>
+                  <a:txBody>
+                    <a:bodyPr/>
+                    <a:lstStyle/>
+                    <a:p>
+                      <a:r>
+                        <a:rPr lang="en-US" dirty="0"/>
+                        <a:t>0.61</a:t>
+                      </a:r>
+                    </a:p>
+                  </a:txBody>
+                  <a:tcPr/>
+                </a:tc>
+                <a:tc>
+                  <a:txBody>
+                    <a:bodyPr/>
+                    <a:lstStyle/>
+                    <a:p>
+                      <a:r>
+                        <a:rPr lang="en-US" dirty="0"/>
+                        <a:t>0.83</a:t>
+                      </a:r>
+                    </a:p>
+                  </a:txBody>
+                  <a:tcPr/>
+                </a:tc>
+                <a:extLst>
+                  <a:ext uri="{0D108BD9-81ED-4DB2-BD59-A6C34878D82A}">
+                    <a16:rowId xmlns:a16="http://schemas.microsoft.com/office/drawing/2014/main" val="4278358894"/>
+                  </a:ext>
+                </a:extLst>
+              </a:tr>
+            </a:tbl>
+          </a:graphicData>
+        </a:graphic>
+      </p:graphicFrame>
+    </p:spTree>
+    <p:extLst>
+      <p:ext uri="{BB962C8B-B14F-4D97-AF65-F5344CB8AC3E}">
+        <p14:creationId xmlns:p14="http://schemas.microsoft.com/office/powerpoint/2010/main" val="2250341342"/>
+      </p:ext>
+    </p:extLst>
+  </p:cSld>
+  <p:clrMapOvr>
+    <a:masterClrMapping/>
+  </p:clrMapOvr>
+</p:sld>
+</file>
+
+<file path=ppt/slides/slide15.xml><?xml version="1.0" encoding="utf-8"?>
+<p:sld xmlns:a="http://schemas.openxmlformats.org/drawingml/2006/main" xmlns:r="http://schemas.openxmlformats.org/officeDocument/2006/relationships" xmlns:p="http://schemas.openxmlformats.org/presentationml/2006/main">
+  <p:cSld>
+    <p:spTree>
+      <p:nvGrpSpPr>
+        <p:cNvPr id="1" name=""/>
+        <p:cNvGrpSpPr/>
+        <p:nvPr/>
+      </p:nvGrpSpPr>
+      <p:grpSpPr>
+        <a:xfrm>
+          <a:off x="0" y="0"/>
+          <a:ext cx="0" cy="0"/>
+          <a:chOff x="0" y="0"/>
+          <a:chExt cx="0" cy="0"/>
+        </a:xfrm>
+      </p:grpSpPr>
+      <p:sp>
+        <p:nvSpPr>
+          <p:cNvPr id="2" name="Title 1">
+            <a:extLst>
+              <a:ext uri="{FF2B5EF4-FFF2-40B4-BE49-F238E27FC236}">
                 <a16:creationId xmlns:a16="http://schemas.microsoft.com/office/drawing/2014/main" id="{48E8B2CB-DDD3-4C53-8805-698F264E6E88}"/>
               </a:ext>
             </a:extLst>
@@ -13518,7 +13829,7 @@
 </p:sld>
 </file>
 
-<file path=ppt/slides/slide15.xml><?xml version="1.0" encoding="utf-8"?>
+<file path=ppt/slides/slide16.xml><?xml version="1.0" encoding="utf-8"?>
 <p:sld xmlns:a="http://schemas.openxmlformats.org/drawingml/2006/main" xmlns:r="http://schemas.openxmlformats.org/officeDocument/2006/relationships" xmlns:p="http://schemas.openxmlformats.org/presentationml/2006/main">
   <p:cSld>
     <p:spTree>
@@ -13743,7 +14054,7 @@
 </p:sld>
 </file>
 
-<file path=ppt/slides/slide16.xml><?xml version="1.0" encoding="utf-8"?>
+<file path=ppt/slides/slide17.xml><?xml version="1.0" encoding="utf-8"?>
 <p:sld xmlns:a="http://schemas.openxmlformats.org/drawingml/2006/main" xmlns:r="http://schemas.openxmlformats.org/officeDocument/2006/relationships" xmlns:p="http://schemas.openxmlformats.org/presentationml/2006/main">
   <p:cSld>
     <p:spTree>
@@ -13919,7 +14230,7 @@
 </p:sld>
 </file>
 
-<file path=ppt/slides/slide17.xml><?xml version="1.0" encoding="utf-8"?>
+<file path=ppt/slides/slide18.xml><?xml version="1.0" encoding="utf-8"?>
 <p:sld xmlns:a="http://schemas.openxmlformats.org/drawingml/2006/main" xmlns:r="http://schemas.openxmlformats.org/officeDocument/2006/relationships" xmlns:p="http://schemas.openxmlformats.org/presentationml/2006/main">
   <p:cSld>
     <p:spTree>
@@ -13988,7 +14299,7 @@
 </p:sld>
 </file>
 
-<file path=ppt/slides/slide18.xml><?xml version="1.0" encoding="utf-8"?>
+<file path=ppt/slides/slide19.xml><?xml version="1.0" encoding="utf-8"?>
 <p:sld xmlns:a="http://schemas.openxmlformats.org/drawingml/2006/main" xmlns:r="http://schemas.openxmlformats.org/officeDocument/2006/relationships" xmlns:p="http://schemas.openxmlformats.org/presentationml/2006/main">
   <p:cSld>
     <p:spTree>

</xml_diff>